<commit_message>
add simulation model solar panel
</commit_message>
<xml_diff>
--- a/Projects/Solar_Powered_Battery/Docs/Solar_Panel_Block-Diagram.pptx
+++ b/Projects/Solar_Powered_Battery/Docs/Solar_Panel_Block-Diagram.pptx
@@ -105,6 +105,11 @@
       </a:defRPr>
     </a:lvl9pPr>
   </p:defaultTextStyle>
+  <p:extLst>
+    <p:ext uri="{EFAFB233-063F-42B5-8137-9DF3F51BA10A}">
+      <p15:sldGuideLst xmlns:p15="http://schemas.microsoft.com/office/powerpoint/2012/main"/>
+    </p:ext>
+  </p:extLst>
 </p:presentation>
 </file>
 
@@ -130,7 +135,7 @@
           <p:cNvPr id="2" name="Title 1">
             <a:extLst>
               <a:ext uri="{FF2B5EF4-FFF2-40B4-BE49-F238E27FC236}">
-                <a16:creationId xmlns:a16="http://schemas.microsoft.com/office/drawing/2014/main" id="{B3236C74-6694-470C-AA1E-26D7D09D5B17}"/>
+                <a16:creationId xmlns="" xmlns:a16="http://schemas.microsoft.com/office/drawing/2014/main" id="{B3236C74-6694-470C-AA1E-26D7D09D5B17}"/>
               </a:ext>
             </a:extLst>
           </p:cNvPr>
@@ -168,7 +173,7 @@
           <p:cNvPr id="3" name="Subtitle 2">
             <a:extLst>
               <a:ext uri="{FF2B5EF4-FFF2-40B4-BE49-F238E27FC236}">
-                <a16:creationId xmlns:a16="http://schemas.microsoft.com/office/drawing/2014/main" id="{2B08928C-6ED9-4F80-A3F6-AE92E33FA64F}"/>
+                <a16:creationId xmlns="" xmlns:a16="http://schemas.microsoft.com/office/drawing/2014/main" id="{2B08928C-6ED9-4F80-A3F6-AE92E33FA64F}"/>
               </a:ext>
             </a:extLst>
           </p:cNvPr>
@@ -239,7 +244,7 @@
           <p:cNvPr id="4" name="Date Placeholder 3">
             <a:extLst>
               <a:ext uri="{FF2B5EF4-FFF2-40B4-BE49-F238E27FC236}">
-                <a16:creationId xmlns:a16="http://schemas.microsoft.com/office/drawing/2014/main" id="{A459CC06-F9AB-42FD-B687-8F22788F2713}"/>
+                <a16:creationId xmlns="" xmlns:a16="http://schemas.microsoft.com/office/drawing/2014/main" id="{A459CC06-F9AB-42FD-B687-8F22788F2713}"/>
               </a:ext>
             </a:extLst>
           </p:cNvPr>
@@ -257,7 +262,7 @@
           <a:p>
             <a:fld id="{D17AF953-0317-44A9-9352-10992F77C37F}" type="datetimeFigureOut">
               <a:rPr lang="en-GB" smtClean="0"/>
-              <a:t>07/04/2019</a:t>
+              <a:t>10/04/2019</a:t>
             </a:fld>
             <a:endParaRPr lang="en-GB"/>
           </a:p>
@@ -268,7 +273,7 @@
           <p:cNvPr id="5" name="Footer Placeholder 4">
             <a:extLst>
               <a:ext uri="{FF2B5EF4-FFF2-40B4-BE49-F238E27FC236}">
-                <a16:creationId xmlns:a16="http://schemas.microsoft.com/office/drawing/2014/main" id="{D33481DD-AFD3-43FC-9D72-40390229B2AB}"/>
+                <a16:creationId xmlns="" xmlns:a16="http://schemas.microsoft.com/office/drawing/2014/main" id="{D33481DD-AFD3-43FC-9D72-40390229B2AB}"/>
               </a:ext>
             </a:extLst>
           </p:cNvPr>
@@ -293,7 +298,7 @@
           <p:cNvPr id="6" name="Slide Number Placeholder 5">
             <a:extLst>
               <a:ext uri="{FF2B5EF4-FFF2-40B4-BE49-F238E27FC236}">
-                <a16:creationId xmlns:a16="http://schemas.microsoft.com/office/drawing/2014/main" id="{DADBFFBC-6EA8-4213-B6BE-3AE03370D5EB}"/>
+                <a16:creationId xmlns="" xmlns:a16="http://schemas.microsoft.com/office/drawing/2014/main" id="{DADBFFBC-6EA8-4213-B6BE-3AE03370D5EB}"/>
               </a:ext>
             </a:extLst>
           </p:cNvPr>
@@ -311,7 +316,7 @@
           <a:p>
             <a:fld id="{85BE8DA1-1086-4D99-A96C-C28D79EAA50A}" type="slidenum">
               <a:rPr lang="en-GB" smtClean="0"/>
-              <a:t>‹#›</a:t>
+              <a:t>‹Nr.›</a:t>
             </a:fld>
             <a:endParaRPr lang="en-GB"/>
           </a:p>
@@ -352,7 +357,7 @@
           <p:cNvPr id="2" name="Title 1">
             <a:extLst>
               <a:ext uri="{FF2B5EF4-FFF2-40B4-BE49-F238E27FC236}">
-                <a16:creationId xmlns:a16="http://schemas.microsoft.com/office/drawing/2014/main" id="{E5BF972C-0FAA-4A74-993A-C85665796B74}"/>
+                <a16:creationId xmlns="" xmlns:a16="http://schemas.microsoft.com/office/drawing/2014/main" id="{E5BF972C-0FAA-4A74-993A-C85665796B74}"/>
               </a:ext>
             </a:extLst>
           </p:cNvPr>
@@ -381,7 +386,7 @@
           <p:cNvPr id="3" name="Vertical Text Placeholder 2">
             <a:extLst>
               <a:ext uri="{FF2B5EF4-FFF2-40B4-BE49-F238E27FC236}">
-                <a16:creationId xmlns:a16="http://schemas.microsoft.com/office/drawing/2014/main" id="{0932CE28-E427-4A66-AAEE-756C297B15FF}"/>
+                <a16:creationId xmlns="" xmlns:a16="http://schemas.microsoft.com/office/drawing/2014/main" id="{0932CE28-E427-4A66-AAEE-756C297B15FF}"/>
               </a:ext>
             </a:extLst>
           </p:cNvPr>
@@ -439,7 +444,7 @@
           <p:cNvPr id="4" name="Date Placeholder 3">
             <a:extLst>
               <a:ext uri="{FF2B5EF4-FFF2-40B4-BE49-F238E27FC236}">
-                <a16:creationId xmlns:a16="http://schemas.microsoft.com/office/drawing/2014/main" id="{DE38380D-0D0E-422A-8B72-103852FE7B02}"/>
+                <a16:creationId xmlns="" xmlns:a16="http://schemas.microsoft.com/office/drawing/2014/main" id="{DE38380D-0D0E-422A-8B72-103852FE7B02}"/>
               </a:ext>
             </a:extLst>
           </p:cNvPr>
@@ -457,7 +462,7 @@
           <a:p>
             <a:fld id="{D17AF953-0317-44A9-9352-10992F77C37F}" type="datetimeFigureOut">
               <a:rPr lang="en-GB" smtClean="0"/>
-              <a:t>07/04/2019</a:t>
+              <a:t>10/04/2019</a:t>
             </a:fld>
             <a:endParaRPr lang="en-GB"/>
           </a:p>
@@ -468,7 +473,7 @@
           <p:cNvPr id="5" name="Footer Placeholder 4">
             <a:extLst>
               <a:ext uri="{FF2B5EF4-FFF2-40B4-BE49-F238E27FC236}">
-                <a16:creationId xmlns:a16="http://schemas.microsoft.com/office/drawing/2014/main" id="{2359FCF8-31D8-4A5F-BD10-1832CA44A12E}"/>
+                <a16:creationId xmlns="" xmlns:a16="http://schemas.microsoft.com/office/drawing/2014/main" id="{2359FCF8-31D8-4A5F-BD10-1832CA44A12E}"/>
               </a:ext>
             </a:extLst>
           </p:cNvPr>
@@ -493,7 +498,7 @@
           <p:cNvPr id="6" name="Slide Number Placeholder 5">
             <a:extLst>
               <a:ext uri="{FF2B5EF4-FFF2-40B4-BE49-F238E27FC236}">
-                <a16:creationId xmlns:a16="http://schemas.microsoft.com/office/drawing/2014/main" id="{11EBA9C2-A13E-43B4-97F2-60A8D0D3BEB6}"/>
+                <a16:creationId xmlns="" xmlns:a16="http://schemas.microsoft.com/office/drawing/2014/main" id="{11EBA9C2-A13E-43B4-97F2-60A8D0D3BEB6}"/>
               </a:ext>
             </a:extLst>
           </p:cNvPr>
@@ -511,7 +516,7 @@
           <a:p>
             <a:fld id="{85BE8DA1-1086-4D99-A96C-C28D79EAA50A}" type="slidenum">
               <a:rPr lang="en-GB" smtClean="0"/>
-              <a:t>‹#›</a:t>
+              <a:t>‹Nr.›</a:t>
             </a:fld>
             <a:endParaRPr lang="en-GB"/>
           </a:p>
@@ -552,7 +557,7 @@
           <p:cNvPr id="2" name="Vertical Title 1">
             <a:extLst>
               <a:ext uri="{FF2B5EF4-FFF2-40B4-BE49-F238E27FC236}">
-                <a16:creationId xmlns:a16="http://schemas.microsoft.com/office/drawing/2014/main" id="{86B04883-6D5B-4C81-819D-FBA626F832DB}"/>
+                <a16:creationId xmlns="" xmlns:a16="http://schemas.microsoft.com/office/drawing/2014/main" id="{86B04883-6D5B-4C81-819D-FBA626F832DB}"/>
               </a:ext>
             </a:extLst>
           </p:cNvPr>
@@ -586,7 +591,7 @@
           <p:cNvPr id="3" name="Vertical Text Placeholder 2">
             <a:extLst>
               <a:ext uri="{FF2B5EF4-FFF2-40B4-BE49-F238E27FC236}">
-                <a16:creationId xmlns:a16="http://schemas.microsoft.com/office/drawing/2014/main" id="{261D5A67-14A9-4465-AB04-A85D19CC4DEB}"/>
+                <a16:creationId xmlns="" xmlns:a16="http://schemas.microsoft.com/office/drawing/2014/main" id="{261D5A67-14A9-4465-AB04-A85D19CC4DEB}"/>
               </a:ext>
             </a:extLst>
           </p:cNvPr>
@@ -649,7 +654,7 @@
           <p:cNvPr id="4" name="Date Placeholder 3">
             <a:extLst>
               <a:ext uri="{FF2B5EF4-FFF2-40B4-BE49-F238E27FC236}">
-                <a16:creationId xmlns:a16="http://schemas.microsoft.com/office/drawing/2014/main" id="{2B71A6B0-207B-4E8C-AB1E-2B279DC7ECF5}"/>
+                <a16:creationId xmlns="" xmlns:a16="http://schemas.microsoft.com/office/drawing/2014/main" id="{2B71A6B0-207B-4E8C-AB1E-2B279DC7ECF5}"/>
               </a:ext>
             </a:extLst>
           </p:cNvPr>
@@ -667,7 +672,7 @@
           <a:p>
             <a:fld id="{D17AF953-0317-44A9-9352-10992F77C37F}" type="datetimeFigureOut">
               <a:rPr lang="en-GB" smtClean="0"/>
-              <a:t>07/04/2019</a:t>
+              <a:t>10/04/2019</a:t>
             </a:fld>
             <a:endParaRPr lang="en-GB"/>
           </a:p>
@@ -678,7 +683,7 @@
           <p:cNvPr id="5" name="Footer Placeholder 4">
             <a:extLst>
               <a:ext uri="{FF2B5EF4-FFF2-40B4-BE49-F238E27FC236}">
-                <a16:creationId xmlns:a16="http://schemas.microsoft.com/office/drawing/2014/main" id="{D2B81265-AC8D-4C1D-BAC1-F0631D6982E0}"/>
+                <a16:creationId xmlns="" xmlns:a16="http://schemas.microsoft.com/office/drawing/2014/main" id="{D2B81265-AC8D-4C1D-BAC1-F0631D6982E0}"/>
               </a:ext>
             </a:extLst>
           </p:cNvPr>
@@ -703,7 +708,7 @@
           <p:cNvPr id="6" name="Slide Number Placeholder 5">
             <a:extLst>
               <a:ext uri="{FF2B5EF4-FFF2-40B4-BE49-F238E27FC236}">
-                <a16:creationId xmlns:a16="http://schemas.microsoft.com/office/drawing/2014/main" id="{1ABDB37E-5F79-4D14-9FEB-760E4B9BCA5B}"/>
+                <a16:creationId xmlns="" xmlns:a16="http://schemas.microsoft.com/office/drawing/2014/main" id="{1ABDB37E-5F79-4D14-9FEB-760E4B9BCA5B}"/>
               </a:ext>
             </a:extLst>
           </p:cNvPr>
@@ -721,7 +726,7 @@
           <a:p>
             <a:fld id="{85BE8DA1-1086-4D99-A96C-C28D79EAA50A}" type="slidenum">
               <a:rPr lang="en-GB" smtClean="0"/>
-              <a:t>‹#›</a:t>
+              <a:t>‹Nr.›</a:t>
             </a:fld>
             <a:endParaRPr lang="en-GB"/>
           </a:p>
@@ -762,7 +767,7 @@
           <p:cNvPr id="2" name="Title 1">
             <a:extLst>
               <a:ext uri="{FF2B5EF4-FFF2-40B4-BE49-F238E27FC236}">
-                <a16:creationId xmlns:a16="http://schemas.microsoft.com/office/drawing/2014/main" id="{31CBBDC7-40F8-499E-9493-10D5A4F2B5AF}"/>
+                <a16:creationId xmlns="" xmlns:a16="http://schemas.microsoft.com/office/drawing/2014/main" id="{31CBBDC7-40F8-499E-9493-10D5A4F2B5AF}"/>
               </a:ext>
             </a:extLst>
           </p:cNvPr>
@@ -791,7 +796,7 @@
           <p:cNvPr id="3" name="Content Placeholder 2">
             <a:extLst>
               <a:ext uri="{FF2B5EF4-FFF2-40B4-BE49-F238E27FC236}">
-                <a16:creationId xmlns:a16="http://schemas.microsoft.com/office/drawing/2014/main" id="{AAF2F201-C9F6-4F53-8B10-CFFF5D7F2CB9}"/>
+                <a16:creationId xmlns="" xmlns:a16="http://schemas.microsoft.com/office/drawing/2014/main" id="{AAF2F201-C9F6-4F53-8B10-CFFF5D7F2CB9}"/>
               </a:ext>
             </a:extLst>
           </p:cNvPr>
@@ -849,7 +854,7 @@
           <p:cNvPr id="4" name="Date Placeholder 3">
             <a:extLst>
               <a:ext uri="{FF2B5EF4-FFF2-40B4-BE49-F238E27FC236}">
-                <a16:creationId xmlns:a16="http://schemas.microsoft.com/office/drawing/2014/main" id="{08206F74-5C58-407E-A773-0D7D75661283}"/>
+                <a16:creationId xmlns="" xmlns:a16="http://schemas.microsoft.com/office/drawing/2014/main" id="{08206F74-5C58-407E-A773-0D7D75661283}"/>
               </a:ext>
             </a:extLst>
           </p:cNvPr>
@@ -867,7 +872,7 @@
           <a:p>
             <a:fld id="{D17AF953-0317-44A9-9352-10992F77C37F}" type="datetimeFigureOut">
               <a:rPr lang="en-GB" smtClean="0"/>
-              <a:t>07/04/2019</a:t>
+              <a:t>10/04/2019</a:t>
             </a:fld>
             <a:endParaRPr lang="en-GB"/>
           </a:p>
@@ -878,7 +883,7 @@
           <p:cNvPr id="5" name="Footer Placeholder 4">
             <a:extLst>
               <a:ext uri="{FF2B5EF4-FFF2-40B4-BE49-F238E27FC236}">
-                <a16:creationId xmlns:a16="http://schemas.microsoft.com/office/drawing/2014/main" id="{A2C0A6B6-6EE0-4960-972A-7DB84C4715A3}"/>
+                <a16:creationId xmlns="" xmlns:a16="http://schemas.microsoft.com/office/drawing/2014/main" id="{A2C0A6B6-6EE0-4960-972A-7DB84C4715A3}"/>
               </a:ext>
             </a:extLst>
           </p:cNvPr>
@@ -903,7 +908,7 @@
           <p:cNvPr id="6" name="Slide Number Placeholder 5">
             <a:extLst>
               <a:ext uri="{FF2B5EF4-FFF2-40B4-BE49-F238E27FC236}">
-                <a16:creationId xmlns:a16="http://schemas.microsoft.com/office/drawing/2014/main" id="{963E7DE0-6D4F-4113-809B-F7A290760DC5}"/>
+                <a16:creationId xmlns="" xmlns:a16="http://schemas.microsoft.com/office/drawing/2014/main" id="{963E7DE0-6D4F-4113-809B-F7A290760DC5}"/>
               </a:ext>
             </a:extLst>
           </p:cNvPr>
@@ -921,7 +926,7 @@
           <a:p>
             <a:fld id="{85BE8DA1-1086-4D99-A96C-C28D79EAA50A}" type="slidenum">
               <a:rPr lang="en-GB" smtClean="0"/>
-              <a:t>‹#›</a:t>
+              <a:t>‹Nr.›</a:t>
             </a:fld>
             <a:endParaRPr lang="en-GB"/>
           </a:p>
@@ -962,7 +967,7 @@
           <p:cNvPr id="2" name="Title 1">
             <a:extLst>
               <a:ext uri="{FF2B5EF4-FFF2-40B4-BE49-F238E27FC236}">
-                <a16:creationId xmlns:a16="http://schemas.microsoft.com/office/drawing/2014/main" id="{CCA80D17-37C9-4D28-A576-D84DACEFCEDE}"/>
+                <a16:creationId xmlns="" xmlns:a16="http://schemas.microsoft.com/office/drawing/2014/main" id="{CCA80D17-37C9-4D28-A576-D84DACEFCEDE}"/>
               </a:ext>
             </a:extLst>
           </p:cNvPr>
@@ -1000,7 +1005,7 @@
           <p:cNvPr id="3" name="Text Placeholder 2">
             <a:extLst>
               <a:ext uri="{FF2B5EF4-FFF2-40B4-BE49-F238E27FC236}">
-                <a16:creationId xmlns:a16="http://schemas.microsoft.com/office/drawing/2014/main" id="{B4FA9E61-0FBD-41DE-8804-D42DE44822C7}"/>
+                <a16:creationId xmlns="" xmlns:a16="http://schemas.microsoft.com/office/drawing/2014/main" id="{B4FA9E61-0FBD-41DE-8804-D42DE44822C7}"/>
               </a:ext>
             </a:extLst>
           </p:cNvPr>
@@ -1125,7 +1130,7 @@
           <p:cNvPr id="4" name="Date Placeholder 3">
             <a:extLst>
               <a:ext uri="{FF2B5EF4-FFF2-40B4-BE49-F238E27FC236}">
-                <a16:creationId xmlns:a16="http://schemas.microsoft.com/office/drawing/2014/main" id="{4CEFDA3E-D969-48EA-B1A6-D74BEDE1B25E}"/>
+                <a16:creationId xmlns="" xmlns:a16="http://schemas.microsoft.com/office/drawing/2014/main" id="{4CEFDA3E-D969-48EA-B1A6-D74BEDE1B25E}"/>
               </a:ext>
             </a:extLst>
           </p:cNvPr>
@@ -1143,7 +1148,7 @@
           <a:p>
             <a:fld id="{D17AF953-0317-44A9-9352-10992F77C37F}" type="datetimeFigureOut">
               <a:rPr lang="en-GB" smtClean="0"/>
-              <a:t>07/04/2019</a:t>
+              <a:t>10/04/2019</a:t>
             </a:fld>
             <a:endParaRPr lang="en-GB"/>
           </a:p>
@@ -1154,7 +1159,7 @@
           <p:cNvPr id="5" name="Footer Placeholder 4">
             <a:extLst>
               <a:ext uri="{FF2B5EF4-FFF2-40B4-BE49-F238E27FC236}">
-                <a16:creationId xmlns:a16="http://schemas.microsoft.com/office/drawing/2014/main" id="{D5306387-4EEE-4B64-9B5D-D366AFDF8B83}"/>
+                <a16:creationId xmlns="" xmlns:a16="http://schemas.microsoft.com/office/drawing/2014/main" id="{D5306387-4EEE-4B64-9B5D-D366AFDF8B83}"/>
               </a:ext>
             </a:extLst>
           </p:cNvPr>
@@ -1179,7 +1184,7 @@
           <p:cNvPr id="6" name="Slide Number Placeholder 5">
             <a:extLst>
               <a:ext uri="{FF2B5EF4-FFF2-40B4-BE49-F238E27FC236}">
-                <a16:creationId xmlns:a16="http://schemas.microsoft.com/office/drawing/2014/main" id="{D7B772FE-7F2A-4CFF-A360-189B61933990}"/>
+                <a16:creationId xmlns="" xmlns:a16="http://schemas.microsoft.com/office/drawing/2014/main" id="{D7B772FE-7F2A-4CFF-A360-189B61933990}"/>
               </a:ext>
             </a:extLst>
           </p:cNvPr>
@@ -1197,7 +1202,7 @@
           <a:p>
             <a:fld id="{85BE8DA1-1086-4D99-A96C-C28D79EAA50A}" type="slidenum">
               <a:rPr lang="en-GB" smtClean="0"/>
-              <a:t>‹#›</a:t>
+              <a:t>‹Nr.›</a:t>
             </a:fld>
             <a:endParaRPr lang="en-GB"/>
           </a:p>
@@ -1238,7 +1243,7 @@
           <p:cNvPr id="2" name="Title 1">
             <a:extLst>
               <a:ext uri="{FF2B5EF4-FFF2-40B4-BE49-F238E27FC236}">
-                <a16:creationId xmlns:a16="http://schemas.microsoft.com/office/drawing/2014/main" id="{E7882D58-A1D0-4091-9156-9602B4DB324E}"/>
+                <a16:creationId xmlns="" xmlns:a16="http://schemas.microsoft.com/office/drawing/2014/main" id="{E7882D58-A1D0-4091-9156-9602B4DB324E}"/>
               </a:ext>
             </a:extLst>
           </p:cNvPr>
@@ -1267,7 +1272,7 @@
           <p:cNvPr id="3" name="Content Placeholder 2">
             <a:extLst>
               <a:ext uri="{FF2B5EF4-FFF2-40B4-BE49-F238E27FC236}">
-                <a16:creationId xmlns:a16="http://schemas.microsoft.com/office/drawing/2014/main" id="{5F101B8B-D2E0-401D-BEC4-D1443CB83750}"/>
+                <a16:creationId xmlns="" xmlns:a16="http://schemas.microsoft.com/office/drawing/2014/main" id="{5F101B8B-D2E0-401D-BEC4-D1443CB83750}"/>
               </a:ext>
             </a:extLst>
           </p:cNvPr>
@@ -1330,7 +1335,7 @@
           <p:cNvPr id="4" name="Content Placeholder 3">
             <a:extLst>
               <a:ext uri="{FF2B5EF4-FFF2-40B4-BE49-F238E27FC236}">
-                <a16:creationId xmlns:a16="http://schemas.microsoft.com/office/drawing/2014/main" id="{961007E4-BF39-4976-9788-30C398026B15}"/>
+                <a16:creationId xmlns="" xmlns:a16="http://schemas.microsoft.com/office/drawing/2014/main" id="{961007E4-BF39-4976-9788-30C398026B15}"/>
               </a:ext>
             </a:extLst>
           </p:cNvPr>
@@ -1393,7 +1398,7 @@
           <p:cNvPr id="5" name="Date Placeholder 4">
             <a:extLst>
               <a:ext uri="{FF2B5EF4-FFF2-40B4-BE49-F238E27FC236}">
-                <a16:creationId xmlns:a16="http://schemas.microsoft.com/office/drawing/2014/main" id="{D22E4DC5-F779-45B0-972B-E265ED40EC36}"/>
+                <a16:creationId xmlns="" xmlns:a16="http://schemas.microsoft.com/office/drawing/2014/main" id="{D22E4DC5-F779-45B0-972B-E265ED40EC36}"/>
               </a:ext>
             </a:extLst>
           </p:cNvPr>
@@ -1411,7 +1416,7 @@
           <a:p>
             <a:fld id="{D17AF953-0317-44A9-9352-10992F77C37F}" type="datetimeFigureOut">
               <a:rPr lang="en-GB" smtClean="0"/>
-              <a:t>07/04/2019</a:t>
+              <a:t>10/04/2019</a:t>
             </a:fld>
             <a:endParaRPr lang="en-GB"/>
           </a:p>
@@ -1422,7 +1427,7 @@
           <p:cNvPr id="6" name="Footer Placeholder 5">
             <a:extLst>
               <a:ext uri="{FF2B5EF4-FFF2-40B4-BE49-F238E27FC236}">
-                <a16:creationId xmlns:a16="http://schemas.microsoft.com/office/drawing/2014/main" id="{30C9AE2B-2491-4CE9-AA67-DF0CAED39CDC}"/>
+                <a16:creationId xmlns="" xmlns:a16="http://schemas.microsoft.com/office/drawing/2014/main" id="{30C9AE2B-2491-4CE9-AA67-DF0CAED39CDC}"/>
               </a:ext>
             </a:extLst>
           </p:cNvPr>
@@ -1447,7 +1452,7 @@
           <p:cNvPr id="7" name="Slide Number Placeholder 6">
             <a:extLst>
               <a:ext uri="{FF2B5EF4-FFF2-40B4-BE49-F238E27FC236}">
-                <a16:creationId xmlns:a16="http://schemas.microsoft.com/office/drawing/2014/main" id="{BB2C19B3-ADC7-44FC-849E-1D0605F4460A}"/>
+                <a16:creationId xmlns="" xmlns:a16="http://schemas.microsoft.com/office/drawing/2014/main" id="{BB2C19B3-ADC7-44FC-849E-1D0605F4460A}"/>
               </a:ext>
             </a:extLst>
           </p:cNvPr>
@@ -1465,7 +1470,7 @@
           <a:p>
             <a:fld id="{85BE8DA1-1086-4D99-A96C-C28D79EAA50A}" type="slidenum">
               <a:rPr lang="en-GB" smtClean="0"/>
-              <a:t>‹#›</a:t>
+              <a:t>‹Nr.›</a:t>
             </a:fld>
             <a:endParaRPr lang="en-GB"/>
           </a:p>
@@ -1506,7 +1511,7 @@
           <p:cNvPr id="2" name="Title 1">
             <a:extLst>
               <a:ext uri="{FF2B5EF4-FFF2-40B4-BE49-F238E27FC236}">
-                <a16:creationId xmlns:a16="http://schemas.microsoft.com/office/drawing/2014/main" id="{DB9EA591-B6EF-4FE6-A738-7E8AA09109DD}"/>
+                <a16:creationId xmlns="" xmlns:a16="http://schemas.microsoft.com/office/drawing/2014/main" id="{DB9EA591-B6EF-4FE6-A738-7E8AA09109DD}"/>
               </a:ext>
             </a:extLst>
           </p:cNvPr>
@@ -1540,7 +1545,7 @@
           <p:cNvPr id="3" name="Text Placeholder 2">
             <a:extLst>
               <a:ext uri="{FF2B5EF4-FFF2-40B4-BE49-F238E27FC236}">
-                <a16:creationId xmlns:a16="http://schemas.microsoft.com/office/drawing/2014/main" id="{A9C709CE-002D-45BE-BE6A-4CC1FF938643}"/>
+                <a16:creationId xmlns="" xmlns:a16="http://schemas.microsoft.com/office/drawing/2014/main" id="{A9C709CE-002D-45BE-BE6A-4CC1FF938643}"/>
               </a:ext>
             </a:extLst>
           </p:cNvPr>
@@ -1611,7 +1616,7 @@
           <p:cNvPr id="4" name="Content Placeholder 3">
             <a:extLst>
               <a:ext uri="{FF2B5EF4-FFF2-40B4-BE49-F238E27FC236}">
-                <a16:creationId xmlns:a16="http://schemas.microsoft.com/office/drawing/2014/main" id="{31136C11-BE64-4610-BAF4-102241D209E7}"/>
+                <a16:creationId xmlns="" xmlns:a16="http://schemas.microsoft.com/office/drawing/2014/main" id="{31136C11-BE64-4610-BAF4-102241D209E7}"/>
               </a:ext>
             </a:extLst>
           </p:cNvPr>
@@ -1674,7 +1679,7 @@
           <p:cNvPr id="5" name="Text Placeholder 4">
             <a:extLst>
               <a:ext uri="{FF2B5EF4-FFF2-40B4-BE49-F238E27FC236}">
-                <a16:creationId xmlns:a16="http://schemas.microsoft.com/office/drawing/2014/main" id="{4C041B08-FA69-43D6-8EEE-08E0A429E23F}"/>
+                <a16:creationId xmlns="" xmlns:a16="http://schemas.microsoft.com/office/drawing/2014/main" id="{4C041B08-FA69-43D6-8EEE-08E0A429E23F}"/>
               </a:ext>
             </a:extLst>
           </p:cNvPr>
@@ -1745,7 +1750,7 @@
           <p:cNvPr id="6" name="Content Placeholder 5">
             <a:extLst>
               <a:ext uri="{FF2B5EF4-FFF2-40B4-BE49-F238E27FC236}">
-                <a16:creationId xmlns:a16="http://schemas.microsoft.com/office/drawing/2014/main" id="{B33611B7-8D02-4E57-A36A-A46821C1A65E}"/>
+                <a16:creationId xmlns="" xmlns:a16="http://schemas.microsoft.com/office/drawing/2014/main" id="{B33611B7-8D02-4E57-A36A-A46821C1A65E}"/>
               </a:ext>
             </a:extLst>
           </p:cNvPr>
@@ -1808,7 +1813,7 @@
           <p:cNvPr id="7" name="Date Placeholder 6">
             <a:extLst>
               <a:ext uri="{FF2B5EF4-FFF2-40B4-BE49-F238E27FC236}">
-                <a16:creationId xmlns:a16="http://schemas.microsoft.com/office/drawing/2014/main" id="{21F45CF5-92FE-4A35-A298-66A0FE005165}"/>
+                <a16:creationId xmlns="" xmlns:a16="http://schemas.microsoft.com/office/drawing/2014/main" id="{21F45CF5-92FE-4A35-A298-66A0FE005165}"/>
               </a:ext>
             </a:extLst>
           </p:cNvPr>
@@ -1826,7 +1831,7 @@
           <a:p>
             <a:fld id="{D17AF953-0317-44A9-9352-10992F77C37F}" type="datetimeFigureOut">
               <a:rPr lang="en-GB" smtClean="0"/>
-              <a:t>07/04/2019</a:t>
+              <a:t>10/04/2019</a:t>
             </a:fld>
             <a:endParaRPr lang="en-GB"/>
           </a:p>
@@ -1837,7 +1842,7 @@
           <p:cNvPr id="8" name="Footer Placeholder 7">
             <a:extLst>
               <a:ext uri="{FF2B5EF4-FFF2-40B4-BE49-F238E27FC236}">
-                <a16:creationId xmlns:a16="http://schemas.microsoft.com/office/drawing/2014/main" id="{58CAF19C-DA1D-4723-913C-622EE7D01299}"/>
+                <a16:creationId xmlns="" xmlns:a16="http://schemas.microsoft.com/office/drawing/2014/main" id="{58CAF19C-DA1D-4723-913C-622EE7D01299}"/>
               </a:ext>
             </a:extLst>
           </p:cNvPr>
@@ -1862,7 +1867,7 @@
           <p:cNvPr id="9" name="Slide Number Placeholder 8">
             <a:extLst>
               <a:ext uri="{FF2B5EF4-FFF2-40B4-BE49-F238E27FC236}">
-                <a16:creationId xmlns:a16="http://schemas.microsoft.com/office/drawing/2014/main" id="{5A4E572D-3DDA-4F56-B083-E568538BDF70}"/>
+                <a16:creationId xmlns="" xmlns:a16="http://schemas.microsoft.com/office/drawing/2014/main" id="{5A4E572D-3DDA-4F56-B083-E568538BDF70}"/>
               </a:ext>
             </a:extLst>
           </p:cNvPr>
@@ -1880,7 +1885,7 @@
           <a:p>
             <a:fld id="{85BE8DA1-1086-4D99-A96C-C28D79EAA50A}" type="slidenum">
               <a:rPr lang="en-GB" smtClean="0"/>
-              <a:t>‹#›</a:t>
+              <a:t>‹Nr.›</a:t>
             </a:fld>
             <a:endParaRPr lang="en-GB"/>
           </a:p>
@@ -1921,7 +1926,7 @@
           <p:cNvPr id="2" name="Title 1">
             <a:extLst>
               <a:ext uri="{FF2B5EF4-FFF2-40B4-BE49-F238E27FC236}">
-                <a16:creationId xmlns:a16="http://schemas.microsoft.com/office/drawing/2014/main" id="{FE4A1B78-3D16-4B94-A525-7A0AFE8FA7E0}"/>
+                <a16:creationId xmlns="" xmlns:a16="http://schemas.microsoft.com/office/drawing/2014/main" id="{FE4A1B78-3D16-4B94-A525-7A0AFE8FA7E0}"/>
               </a:ext>
             </a:extLst>
           </p:cNvPr>
@@ -1950,7 +1955,7 @@
           <p:cNvPr id="3" name="Date Placeholder 2">
             <a:extLst>
               <a:ext uri="{FF2B5EF4-FFF2-40B4-BE49-F238E27FC236}">
-                <a16:creationId xmlns:a16="http://schemas.microsoft.com/office/drawing/2014/main" id="{C475D3FE-9BA2-4EE5-BCA8-CA4CA278CC3A}"/>
+                <a16:creationId xmlns="" xmlns:a16="http://schemas.microsoft.com/office/drawing/2014/main" id="{C475D3FE-9BA2-4EE5-BCA8-CA4CA278CC3A}"/>
               </a:ext>
             </a:extLst>
           </p:cNvPr>
@@ -1968,7 +1973,7 @@
           <a:p>
             <a:fld id="{D17AF953-0317-44A9-9352-10992F77C37F}" type="datetimeFigureOut">
               <a:rPr lang="en-GB" smtClean="0"/>
-              <a:t>07/04/2019</a:t>
+              <a:t>10/04/2019</a:t>
             </a:fld>
             <a:endParaRPr lang="en-GB"/>
           </a:p>
@@ -1979,7 +1984,7 @@
           <p:cNvPr id="4" name="Footer Placeholder 3">
             <a:extLst>
               <a:ext uri="{FF2B5EF4-FFF2-40B4-BE49-F238E27FC236}">
-                <a16:creationId xmlns:a16="http://schemas.microsoft.com/office/drawing/2014/main" id="{61652F7D-7EF3-455D-8D8A-851058205AB1}"/>
+                <a16:creationId xmlns="" xmlns:a16="http://schemas.microsoft.com/office/drawing/2014/main" id="{61652F7D-7EF3-455D-8D8A-851058205AB1}"/>
               </a:ext>
             </a:extLst>
           </p:cNvPr>
@@ -2004,7 +2009,7 @@
           <p:cNvPr id="5" name="Slide Number Placeholder 4">
             <a:extLst>
               <a:ext uri="{FF2B5EF4-FFF2-40B4-BE49-F238E27FC236}">
-                <a16:creationId xmlns:a16="http://schemas.microsoft.com/office/drawing/2014/main" id="{9896B126-3DEE-43BC-A56D-E0AFE9B0F3F3}"/>
+                <a16:creationId xmlns="" xmlns:a16="http://schemas.microsoft.com/office/drawing/2014/main" id="{9896B126-3DEE-43BC-A56D-E0AFE9B0F3F3}"/>
               </a:ext>
             </a:extLst>
           </p:cNvPr>
@@ -2022,7 +2027,7 @@
           <a:p>
             <a:fld id="{85BE8DA1-1086-4D99-A96C-C28D79EAA50A}" type="slidenum">
               <a:rPr lang="en-GB" smtClean="0"/>
-              <a:t>‹#›</a:t>
+              <a:t>‹Nr.›</a:t>
             </a:fld>
             <a:endParaRPr lang="en-GB"/>
           </a:p>
@@ -2063,7 +2068,7 @@
           <p:cNvPr id="2" name="Date Placeholder 1">
             <a:extLst>
               <a:ext uri="{FF2B5EF4-FFF2-40B4-BE49-F238E27FC236}">
-                <a16:creationId xmlns:a16="http://schemas.microsoft.com/office/drawing/2014/main" id="{976A992E-DD0E-4D26-992C-19BF060EC66F}"/>
+                <a16:creationId xmlns="" xmlns:a16="http://schemas.microsoft.com/office/drawing/2014/main" id="{976A992E-DD0E-4D26-992C-19BF060EC66F}"/>
               </a:ext>
             </a:extLst>
           </p:cNvPr>
@@ -2081,7 +2086,7 @@
           <a:p>
             <a:fld id="{D17AF953-0317-44A9-9352-10992F77C37F}" type="datetimeFigureOut">
               <a:rPr lang="en-GB" smtClean="0"/>
-              <a:t>07/04/2019</a:t>
+              <a:t>10/04/2019</a:t>
             </a:fld>
             <a:endParaRPr lang="en-GB"/>
           </a:p>
@@ -2092,7 +2097,7 @@
           <p:cNvPr id="3" name="Footer Placeholder 2">
             <a:extLst>
               <a:ext uri="{FF2B5EF4-FFF2-40B4-BE49-F238E27FC236}">
-                <a16:creationId xmlns:a16="http://schemas.microsoft.com/office/drawing/2014/main" id="{B475AB91-ED5B-4763-847F-5E47A6DA72CD}"/>
+                <a16:creationId xmlns="" xmlns:a16="http://schemas.microsoft.com/office/drawing/2014/main" id="{B475AB91-ED5B-4763-847F-5E47A6DA72CD}"/>
               </a:ext>
             </a:extLst>
           </p:cNvPr>
@@ -2117,7 +2122,7 @@
           <p:cNvPr id="4" name="Slide Number Placeholder 3">
             <a:extLst>
               <a:ext uri="{FF2B5EF4-FFF2-40B4-BE49-F238E27FC236}">
-                <a16:creationId xmlns:a16="http://schemas.microsoft.com/office/drawing/2014/main" id="{A20071F0-041E-4117-89D0-54AE87EA282C}"/>
+                <a16:creationId xmlns="" xmlns:a16="http://schemas.microsoft.com/office/drawing/2014/main" id="{A20071F0-041E-4117-89D0-54AE87EA282C}"/>
               </a:ext>
             </a:extLst>
           </p:cNvPr>
@@ -2135,7 +2140,7 @@
           <a:p>
             <a:fld id="{85BE8DA1-1086-4D99-A96C-C28D79EAA50A}" type="slidenum">
               <a:rPr lang="en-GB" smtClean="0"/>
-              <a:t>‹#›</a:t>
+              <a:t>‹Nr.›</a:t>
             </a:fld>
             <a:endParaRPr lang="en-GB"/>
           </a:p>
@@ -2176,7 +2181,7 @@
           <p:cNvPr id="2" name="Title 1">
             <a:extLst>
               <a:ext uri="{FF2B5EF4-FFF2-40B4-BE49-F238E27FC236}">
-                <a16:creationId xmlns:a16="http://schemas.microsoft.com/office/drawing/2014/main" id="{28A753CA-358C-441A-A5F7-F925B2EB25A4}"/>
+                <a16:creationId xmlns="" xmlns:a16="http://schemas.microsoft.com/office/drawing/2014/main" id="{28A753CA-358C-441A-A5F7-F925B2EB25A4}"/>
               </a:ext>
             </a:extLst>
           </p:cNvPr>
@@ -2214,7 +2219,7 @@
           <p:cNvPr id="3" name="Content Placeholder 2">
             <a:extLst>
               <a:ext uri="{FF2B5EF4-FFF2-40B4-BE49-F238E27FC236}">
-                <a16:creationId xmlns:a16="http://schemas.microsoft.com/office/drawing/2014/main" id="{692530CE-6245-415F-A132-3C97465B68B3}"/>
+                <a16:creationId xmlns="" xmlns:a16="http://schemas.microsoft.com/office/drawing/2014/main" id="{692530CE-6245-415F-A132-3C97465B68B3}"/>
               </a:ext>
             </a:extLst>
           </p:cNvPr>
@@ -2305,7 +2310,7 @@
           <p:cNvPr id="4" name="Text Placeholder 3">
             <a:extLst>
               <a:ext uri="{FF2B5EF4-FFF2-40B4-BE49-F238E27FC236}">
-                <a16:creationId xmlns:a16="http://schemas.microsoft.com/office/drawing/2014/main" id="{77D219A8-BC35-4A8F-B0DB-1B1AD6FB0376}"/>
+                <a16:creationId xmlns="" xmlns:a16="http://schemas.microsoft.com/office/drawing/2014/main" id="{77D219A8-BC35-4A8F-B0DB-1B1AD6FB0376}"/>
               </a:ext>
             </a:extLst>
           </p:cNvPr>
@@ -2376,7 +2381,7 @@
           <p:cNvPr id="5" name="Date Placeholder 4">
             <a:extLst>
               <a:ext uri="{FF2B5EF4-FFF2-40B4-BE49-F238E27FC236}">
-                <a16:creationId xmlns:a16="http://schemas.microsoft.com/office/drawing/2014/main" id="{A06B0DED-C021-45F4-967B-35F17B2BAD3A}"/>
+                <a16:creationId xmlns="" xmlns:a16="http://schemas.microsoft.com/office/drawing/2014/main" id="{A06B0DED-C021-45F4-967B-35F17B2BAD3A}"/>
               </a:ext>
             </a:extLst>
           </p:cNvPr>
@@ -2394,7 +2399,7 @@
           <a:p>
             <a:fld id="{D17AF953-0317-44A9-9352-10992F77C37F}" type="datetimeFigureOut">
               <a:rPr lang="en-GB" smtClean="0"/>
-              <a:t>07/04/2019</a:t>
+              <a:t>10/04/2019</a:t>
             </a:fld>
             <a:endParaRPr lang="en-GB"/>
           </a:p>
@@ -2405,7 +2410,7 @@
           <p:cNvPr id="6" name="Footer Placeholder 5">
             <a:extLst>
               <a:ext uri="{FF2B5EF4-FFF2-40B4-BE49-F238E27FC236}">
-                <a16:creationId xmlns:a16="http://schemas.microsoft.com/office/drawing/2014/main" id="{55C77CAE-A203-4E75-A5BE-365048EE92B6}"/>
+                <a16:creationId xmlns="" xmlns:a16="http://schemas.microsoft.com/office/drawing/2014/main" id="{55C77CAE-A203-4E75-A5BE-365048EE92B6}"/>
               </a:ext>
             </a:extLst>
           </p:cNvPr>
@@ -2430,7 +2435,7 @@
           <p:cNvPr id="7" name="Slide Number Placeholder 6">
             <a:extLst>
               <a:ext uri="{FF2B5EF4-FFF2-40B4-BE49-F238E27FC236}">
-                <a16:creationId xmlns:a16="http://schemas.microsoft.com/office/drawing/2014/main" id="{223EA66E-4098-405E-ABEA-FE3C6B880D21}"/>
+                <a16:creationId xmlns="" xmlns:a16="http://schemas.microsoft.com/office/drawing/2014/main" id="{223EA66E-4098-405E-ABEA-FE3C6B880D21}"/>
               </a:ext>
             </a:extLst>
           </p:cNvPr>
@@ -2448,7 +2453,7 @@
           <a:p>
             <a:fld id="{85BE8DA1-1086-4D99-A96C-C28D79EAA50A}" type="slidenum">
               <a:rPr lang="en-GB" smtClean="0"/>
-              <a:t>‹#›</a:t>
+              <a:t>‹Nr.›</a:t>
             </a:fld>
             <a:endParaRPr lang="en-GB"/>
           </a:p>
@@ -2489,7 +2494,7 @@
           <p:cNvPr id="2" name="Title 1">
             <a:extLst>
               <a:ext uri="{FF2B5EF4-FFF2-40B4-BE49-F238E27FC236}">
-                <a16:creationId xmlns:a16="http://schemas.microsoft.com/office/drawing/2014/main" id="{C06EFA83-BE46-4791-94BE-E3528DB8FA28}"/>
+                <a16:creationId xmlns="" xmlns:a16="http://schemas.microsoft.com/office/drawing/2014/main" id="{C06EFA83-BE46-4791-94BE-E3528DB8FA28}"/>
               </a:ext>
             </a:extLst>
           </p:cNvPr>
@@ -2527,7 +2532,7 @@
           <p:cNvPr id="3" name="Picture Placeholder 2">
             <a:extLst>
               <a:ext uri="{FF2B5EF4-FFF2-40B4-BE49-F238E27FC236}">
-                <a16:creationId xmlns:a16="http://schemas.microsoft.com/office/drawing/2014/main" id="{9DD1347F-82DD-4770-8EAD-F5A715729C94}"/>
+                <a16:creationId xmlns="" xmlns:a16="http://schemas.microsoft.com/office/drawing/2014/main" id="{9DD1347F-82DD-4770-8EAD-F5A715729C94}"/>
               </a:ext>
             </a:extLst>
           </p:cNvPr>
@@ -2594,7 +2599,7 @@
           <p:cNvPr id="4" name="Text Placeholder 3">
             <a:extLst>
               <a:ext uri="{FF2B5EF4-FFF2-40B4-BE49-F238E27FC236}">
-                <a16:creationId xmlns:a16="http://schemas.microsoft.com/office/drawing/2014/main" id="{E9A69CD7-6103-40E4-96A7-45896F326EF8}"/>
+                <a16:creationId xmlns="" xmlns:a16="http://schemas.microsoft.com/office/drawing/2014/main" id="{E9A69CD7-6103-40E4-96A7-45896F326EF8}"/>
               </a:ext>
             </a:extLst>
           </p:cNvPr>
@@ -2665,7 +2670,7 @@
           <p:cNvPr id="5" name="Date Placeholder 4">
             <a:extLst>
               <a:ext uri="{FF2B5EF4-FFF2-40B4-BE49-F238E27FC236}">
-                <a16:creationId xmlns:a16="http://schemas.microsoft.com/office/drawing/2014/main" id="{5347FEAA-55C7-437F-B192-33095BF6EDF3}"/>
+                <a16:creationId xmlns="" xmlns:a16="http://schemas.microsoft.com/office/drawing/2014/main" id="{5347FEAA-55C7-437F-B192-33095BF6EDF3}"/>
               </a:ext>
             </a:extLst>
           </p:cNvPr>
@@ -2683,7 +2688,7 @@
           <a:p>
             <a:fld id="{D17AF953-0317-44A9-9352-10992F77C37F}" type="datetimeFigureOut">
               <a:rPr lang="en-GB" smtClean="0"/>
-              <a:t>07/04/2019</a:t>
+              <a:t>10/04/2019</a:t>
             </a:fld>
             <a:endParaRPr lang="en-GB"/>
           </a:p>
@@ -2694,7 +2699,7 @@
           <p:cNvPr id="6" name="Footer Placeholder 5">
             <a:extLst>
               <a:ext uri="{FF2B5EF4-FFF2-40B4-BE49-F238E27FC236}">
-                <a16:creationId xmlns:a16="http://schemas.microsoft.com/office/drawing/2014/main" id="{E3633EE5-41D7-4287-957B-D897C096F3F9}"/>
+                <a16:creationId xmlns="" xmlns:a16="http://schemas.microsoft.com/office/drawing/2014/main" id="{E3633EE5-41D7-4287-957B-D897C096F3F9}"/>
               </a:ext>
             </a:extLst>
           </p:cNvPr>
@@ -2719,7 +2724,7 @@
           <p:cNvPr id="7" name="Slide Number Placeholder 6">
             <a:extLst>
               <a:ext uri="{FF2B5EF4-FFF2-40B4-BE49-F238E27FC236}">
-                <a16:creationId xmlns:a16="http://schemas.microsoft.com/office/drawing/2014/main" id="{92EC4B69-3C3F-466D-9D03-87230E447A5B}"/>
+                <a16:creationId xmlns="" xmlns:a16="http://schemas.microsoft.com/office/drawing/2014/main" id="{92EC4B69-3C3F-466D-9D03-87230E447A5B}"/>
               </a:ext>
             </a:extLst>
           </p:cNvPr>
@@ -2737,7 +2742,7 @@
           <a:p>
             <a:fld id="{85BE8DA1-1086-4D99-A96C-C28D79EAA50A}" type="slidenum">
               <a:rPr lang="en-GB" smtClean="0"/>
-              <a:t>‹#›</a:t>
+              <a:t>‹Nr.›</a:t>
             </a:fld>
             <a:endParaRPr lang="en-GB"/>
           </a:p>
@@ -2783,7 +2788,7 @@
           <p:cNvPr id="2" name="Title Placeholder 1">
             <a:extLst>
               <a:ext uri="{FF2B5EF4-FFF2-40B4-BE49-F238E27FC236}">
-                <a16:creationId xmlns:a16="http://schemas.microsoft.com/office/drawing/2014/main" id="{50A07CA2-548F-42C2-8651-88B375E3A136}"/>
+                <a16:creationId xmlns="" xmlns:a16="http://schemas.microsoft.com/office/drawing/2014/main" id="{50A07CA2-548F-42C2-8651-88B375E3A136}"/>
               </a:ext>
             </a:extLst>
           </p:cNvPr>
@@ -2822,7 +2827,7 @@
           <p:cNvPr id="3" name="Text Placeholder 2">
             <a:extLst>
               <a:ext uri="{FF2B5EF4-FFF2-40B4-BE49-F238E27FC236}">
-                <a16:creationId xmlns:a16="http://schemas.microsoft.com/office/drawing/2014/main" id="{167C21C2-5E3A-4577-A8A8-405C743BF969}"/>
+                <a16:creationId xmlns="" xmlns:a16="http://schemas.microsoft.com/office/drawing/2014/main" id="{167C21C2-5E3A-4577-A8A8-405C743BF969}"/>
               </a:ext>
             </a:extLst>
           </p:cNvPr>
@@ -2890,7 +2895,7 @@
           <p:cNvPr id="4" name="Date Placeholder 3">
             <a:extLst>
               <a:ext uri="{FF2B5EF4-FFF2-40B4-BE49-F238E27FC236}">
-                <a16:creationId xmlns:a16="http://schemas.microsoft.com/office/drawing/2014/main" id="{C326595E-B8E6-4F2E-B92D-E69A67010311}"/>
+                <a16:creationId xmlns="" xmlns:a16="http://schemas.microsoft.com/office/drawing/2014/main" id="{C326595E-B8E6-4F2E-B92D-E69A67010311}"/>
               </a:ext>
             </a:extLst>
           </p:cNvPr>
@@ -2926,7 +2931,7 @@
           <a:p>
             <a:fld id="{D17AF953-0317-44A9-9352-10992F77C37F}" type="datetimeFigureOut">
               <a:rPr lang="en-GB" smtClean="0"/>
-              <a:t>07/04/2019</a:t>
+              <a:t>10/04/2019</a:t>
             </a:fld>
             <a:endParaRPr lang="en-GB"/>
           </a:p>
@@ -2937,7 +2942,7 @@
           <p:cNvPr id="5" name="Footer Placeholder 4">
             <a:extLst>
               <a:ext uri="{FF2B5EF4-FFF2-40B4-BE49-F238E27FC236}">
-                <a16:creationId xmlns:a16="http://schemas.microsoft.com/office/drawing/2014/main" id="{1C7FEBC8-303C-47D3-8E33-A40A36E5A70F}"/>
+                <a16:creationId xmlns="" xmlns:a16="http://schemas.microsoft.com/office/drawing/2014/main" id="{1C7FEBC8-303C-47D3-8E33-A40A36E5A70F}"/>
               </a:ext>
             </a:extLst>
           </p:cNvPr>
@@ -2980,7 +2985,7 @@
           <p:cNvPr id="6" name="Slide Number Placeholder 5">
             <a:extLst>
               <a:ext uri="{FF2B5EF4-FFF2-40B4-BE49-F238E27FC236}">
-                <a16:creationId xmlns:a16="http://schemas.microsoft.com/office/drawing/2014/main" id="{6EBF2055-EA90-4384-B5FD-EF8F50BA15A8}"/>
+                <a16:creationId xmlns="" xmlns:a16="http://schemas.microsoft.com/office/drawing/2014/main" id="{6EBF2055-EA90-4384-B5FD-EF8F50BA15A8}"/>
               </a:ext>
             </a:extLst>
           </p:cNvPr>
@@ -3016,7 +3021,7 @@
           <a:p>
             <a:fld id="{85BE8DA1-1086-4D99-A96C-C28D79EAA50A}" type="slidenum">
               <a:rPr lang="en-GB" smtClean="0"/>
-              <a:t>‹#›</a:t>
+              <a:t>‹Nr.›</a:t>
             </a:fld>
             <a:endParaRPr lang="en-GB"/>
           </a:p>
@@ -3348,7 +3353,7 @@
           <p:cNvPr id="4" name="Rectangle 3">
             <a:extLst>
               <a:ext uri="{FF2B5EF4-FFF2-40B4-BE49-F238E27FC236}">
-                <a16:creationId xmlns:a16="http://schemas.microsoft.com/office/drawing/2014/main" id="{FB55FA98-77B3-4469-93CE-77519E8BEDBB}"/>
+                <a16:creationId xmlns="" xmlns:a16="http://schemas.microsoft.com/office/drawing/2014/main" id="{FB55FA98-77B3-4469-93CE-77519E8BEDBB}"/>
               </a:ext>
             </a:extLst>
           </p:cNvPr>
@@ -3357,7 +3362,7 @@
         </p:nvSpPr>
         <p:spPr>
           <a:xfrm>
-            <a:off x="144780" y="520700"/>
+            <a:off x="7511737" y="4134688"/>
             <a:ext cx="4572000" cy="2413001"/>
           </a:xfrm>
           <a:prstGeom prst="rect">
@@ -3397,10 +3402,10 @@
       </p:sp>
       <p:sp>
         <p:nvSpPr>
-          <p:cNvPr id="6" name="Rectangle 5">
-            <a:extLst>
-              <a:ext uri="{FF2B5EF4-FFF2-40B4-BE49-F238E27FC236}">
-                <a16:creationId xmlns:a16="http://schemas.microsoft.com/office/drawing/2014/main" id="{52666528-B82C-4F9B-974D-EE782DE10B7C}"/>
+          <p:cNvPr id="8" name="Rectangle 7">
+            <a:extLst>
+              <a:ext uri="{FF2B5EF4-FFF2-40B4-BE49-F238E27FC236}">
+                <a16:creationId xmlns="" xmlns:a16="http://schemas.microsoft.com/office/drawing/2014/main" id="{A538DD01-2636-4589-96E2-29858AFC475E}"/>
               </a:ext>
             </a:extLst>
           </p:cNvPr>
@@ -3409,8 +3414,8 @@
         </p:nvSpPr>
         <p:spPr>
           <a:xfrm>
-            <a:off x="766438" y="1429304"/>
-            <a:ext cx="1183689" cy="1242872"/>
+            <a:off x="320308" y="875575"/>
+            <a:ext cx="818379" cy="859297"/>
           </a:xfrm>
           <a:prstGeom prst="rect">
             <a:avLst/>
@@ -3444,7 +3449,7 @@
           <a:p>
             <a:pPr algn="ctr"/>
             <a:r>
-              <a:rPr lang="de-DE" dirty="0">
+              <a:rPr lang="de-DE" sz="1200" dirty="0" smtClean="0">
                 <a:solidFill>
                   <a:schemeClr val="tx1"/>
                 </a:solidFill>
@@ -3455,14 +3460,14 @@
           <a:p>
             <a:pPr algn="ctr"/>
             <a:r>
-              <a:rPr lang="de-DE" dirty="0">
+              <a:rPr lang="de-DE" sz="1200" dirty="0" smtClean="0">
                 <a:solidFill>
                   <a:schemeClr val="tx1"/>
                 </a:solidFill>
               </a:rPr>
               <a:t>12V 1.5W</a:t>
             </a:r>
-            <a:endParaRPr lang="en-GB" dirty="0">
+            <a:endParaRPr lang="en-GB" sz="1200" dirty="0">
               <a:solidFill>
                 <a:schemeClr val="tx1"/>
               </a:solidFill>
@@ -3472,10 +3477,10 @@
       </p:sp>
       <p:sp>
         <p:nvSpPr>
-          <p:cNvPr id="8" name="Rectangle 7">
-            <a:extLst>
-              <a:ext uri="{FF2B5EF4-FFF2-40B4-BE49-F238E27FC236}">
-                <a16:creationId xmlns:a16="http://schemas.microsoft.com/office/drawing/2014/main" id="{A538DD01-2636-4589-96E2-29858AFC475E}"/>
+          <p:cNvPr id="9" name="Rectangle 8">
+            <a:extLst>
+              <a:ext uri="{FF2B5EF4-FFF2-40B4-BE49-F238E27FC236}">
+                <a16:creationId xmlns="" xmlns:a16="http://schemas.microsoft.com/office/drawing/2014/main" id="{95242C81-4C58-4A1C-A2A8-9ED57DAB361B}"/>
               </a:ext>
             </a:extLst>
           </p:cNvPr>
@@ -3484,83 +3489,8 @@
         </p:nvSpPr>
         <p:spPr>
           <a:xfrm>
-            <a:off x="2511418" y="1429304"/>
-            <a:ext cx="1183689" cy="1242872"/>
-          </a:xfrm>
-          <a:prstGeom prst="rect">
-            <a:avLst/>
-          </a:prstGeom>
-          <a:solidFill>
-            <a:schemeClr val="accent1">
-              <a:lumMod val="40000"/>
-              <a:lumOff val="60000"/>
-            </a:schemeClr>
-          </a:solidFill>
-        </p:spPr>
-        <p:style>
-          <a:lnRef idx="2">
-            <a:schemeClr val="accent1">
-              <a:shade val="50000"/>
-            </a:schemeClr>
-          </a:lnRef>
-          <a:fillRef idx="1">
-            <a:schemeClr val="accent1"/>
-          </a:fillRef>
-          <a:effectRef idx="0">
-            <a:schemeClr val="accent1"/>
-          </a:effectRef>
-          <a:fontRef idx="minor">
-            <a:schemeClr val="lt1"/>
-          </a:fontRef>
-        </p:style>
-        <p:txBody>
-          <a:bodyPr rtlCol="0" anchor="ctr"/>
-          <a:lstStyle/>
-          <a:p>
-            <a:pPr algn="ctr"/>
-            <a:r>
-              <a:rPr lang="de-DE" dirty="0">
-                <a:solidFill>
-                  <a:schemeClr val="tx1"/>
-                </a:solidFill>
-              </a:rPr>
-              <a:t>SP</a:t>
-            </a:r>
-          </a:p>
-          <a:p>
-            <a:pPr algn="ctr"/>
-            <a:r>
-              <a:rPr lang="de-DE" dirty="0">
-                <a:solidFill>
-                  <a:schemeClr val="tx1"/>
-                </a:solidFill>
-              </a:rPr>
-              <a:t>12V 1.5W</a:t>
-            </a:r>
-            <a:endParaRPr lang="en-GB" dirty="0">
-              <a:solidFill>
-                <a:schemeClr val="tx1"/>
-              </a:solidFill>
-            </a:endParaRPr>
-          </a:p>
-        </p:txBody>
-      </p:sp>
-      <p:sp>
-        <p:nvSpPr>
-          <p:cNvPr id="9" name="Rectangle 8">
-            <a:extLst>
-              <a:ext uri="{FF2B5EF4-FFF2-40B4-BE49-F238E27FC236}">
-                <a16:creationId xmlns:a16="http://schemas.microsoft.com/office/drawing/2014/main" id="{95242C81-4C58-4A1C-A2A8-9ED57DAB361B}"/>
-              </a:ext>
-            </a:extLst>
-          </p:cNvPr>
-          <p:cNvSpPr/>
-          <p:nvPr/>
-        </p:nvSpPr>
-        <p:spPr>
-          <a:xfrm>
-            <a:off x="5163845" y="923277"/>
-            <a:ext cx="1864310" cy="4083728"/>
+            <a:off x="4658264" y="4571999"/>
+            <a:ext cx="2231868" cy="1375285"/>
           </a:xfrm>
           <a:prstGeom prst="rect">
             <a:avLst/>
@@ -3593,308 +3523,34 @@
           <a:lstStyle/>
           <a:p>
             <a:pPr algn="ctr"/>
-            <a:endParaRPr lang="en-GB"/>
-          </a:p>
-        </p:txBody>
-      </p:sp>
-      <p:grpSp>
-        <p:nvGrpSpPr>
-          <p:cNvPr id="14" name="Group 13">
-            <a:extLst>
-              <a:ext uri="{FF2B5EF4-FFF2-40B4-BE49-F238E27FC236}">
-                <a16:creationId xmlns:a16="http://schemas.microsoft.com/office/drawing/2014/main" id="{FFE6B30D-04DF-426B-84AB-783A2BEB98C8}"/>
-              </a:ext>
-            </a:extLst>
-          </p:cNvPr>
-          <p:cNvGrpSpPr/>
-          <p:nvPr/>
-        </p:nvGrpSpPr>
-        <p:grpSpPr>
-          <a:xfrm>
-            <a:off x="334705" y="1885951"/>
-            <a:ext cx="241808" cy="208455"/>
-            <a:chOff x="2031492" y="4465320"/>
-            <a:chExt cx="353568" cy="304800"/>
-          </a:xfrm>
-        </p:grpSpPr>
-        <p:sp>
-          <p:nvSpPr>
-            <p:cNvPr id="10" name="Isosceles Triangle 9">
-              <a:extLst>
-                <a:ext uri="{FF2B5EF4-FFF2-40B4-BE49-F238E27FC236}">
-                  <a16:creationId xmlns:a16="http://schemas.microsoft.com/office/drawing/2014/main" id="{95A252BE-CF21-4EE6-AFDF-9FEC58668D6E}"/>
-                </a:ext>
-              </a:extLst>
-            </p:cNvPr>
-            <p:cNvSpPr/>
-            <p:nvPr/>
-          </p:nvSpPr>
-          <p:spPr>
-            <a:xfrm>
-              <a:off x="2031492" y="4465320"/>
-              <a:ext cx="353568" cy="304800"/>
-            </a:xfrm>
-            <a:prstGeom prst="triangle">
-              <a:avLst/>
-            </a:prstGeom>
-            <a:solidFill>
-              <a:schemeClr val="bg1"/>
-            </a:solidFill>
-            <a:ln>
-              <a:solidFill>
-                <a:schemeClr val="tx1"/>
-              </a:solidFill>
-            </a:ln>
-          </p:spPr>
-          <p:style>
-            <a:lnRef idx="2">
-              <a:schemeClr val="accent1">
-                <a:shade val="50000"/>
-              </a:schemeClr>
-            </a:lnRef>
-            <a:fillRef idx="1">
-              <a:schemeClr val="accent1"/>
-            </a:fillRef>
-            <a:effectRef idx="0">
-              <a:schemeClr val="accent1"/>
-            </a:effectRef>
-            <a:fontRef idx="minor">
-              <a:schemeClr val="lt1"/>
-            </a:fontRef>
-          </p:style>
-          <p:txBody>
-            <a:bodyPr rtlCol="0" anchor="ctr"/>
-            <a:lstStyle/>
-            <a:p>
-              <a:pPr algn="ctr"/>
-              <a:endParaRPr lang="en-GB"/>
-            </a:p>
-          </p:txBody>
-        </p:sp>
-        <p:cxnSp>
-          <p:nvCxnSpPr>
-            <p:cNvPr id="12" name="Straight Connector 11">
-              <a:extLst>
-                <a:ext uri="{FF2B5EF4-FFF2-40B4-BE49-F238E27FC236}">
-                  <a16:creationId xmlns:a16="http://schemas.microsoft.com/office/drawing/2014/main" id="{6C503AD4-3FCE-43FB-ADE9-AE709BE8F6FE}"/>
-                </a:ext>
-              </a:extLst>
-            </p:cNvPr>
-            <p:cNvCxnSpPr/>
-            <p:nvPr/>
-          </p:nvCxnSpPr>
-          <p:spPr>
-            <a:xfrm>
-              <a:off x="2031492" y="4465320"/>
-              <a:ext cx="353568" cy="0"/>
-            </a:xfrm>
-            <a:prstGeom prst="line">
-              <a:avLst/>
-            </a:prstGeom>
-            <a:ln w="19050">
-              <a:solidFill>
-                <a:schemeClr val="tx1"/>
-              </a:solidFill>
-            </a:ln>
-          </p:spPr>
-          <p:style>
-            <a:lnRef idx="1">
-              <a:schemeClr val="accent1"/>
-            </a:lnRef>
-            <a:fillRef idx="0">
-              <a:schemeClr val="accent1"/>
-            </a:fillRef>
-            <a:effectRef idx="0">
-              <a:schemeClr val="accent1"/>
-            </a:effectRef>
-            <a:fontRef idx="minor">
-              <a:schemeClr val="tx1"/>
-            </a:fontRef>
-          </p:style>
-        </p:cxnSp>
-      </p:grpSp>
-      <p:grpSp>
-        <p:nvGrpSpPr>
-          <p:cNvPr id="15" name="Group 14">
-            <a:extLst>
-              <a:ext uri="{FF2B5EF4-FFF2-40B4-BE49-F238E27FC236}">
-                <a16:creationId xmlns:a16="http://schemas.microsoft.com/office/drawing/2014/main" id="{310DA54F-6D01-4850-BE48-445083A290F8}"/>
-              </a:ext>
-            </a:extLst>
-          </p:cNvPr>
-          <p:cNvGrpSpPr/>
-          <p:nvPr/>
-        </p:nvGrpSpPr>
-        <p:grpSpPr>
-          <a:xfrm>
-            <a:off x="2109868" y="1885951"/>
-            <a:ext cx="241808" cy="208455"/>
-            <a:chOff x="2031492" y="4465320"/>
-            <a:chExt cx="353568" cy="304800"/>
-          </a:xfrm>
-        </p:grpSpPr>
-        <p:sp>
-          <p:nvSpPr>
-            <p:cNvPr id="16" name="Isosceles Triangle 15">
-              <a:extLst>
-                <a:ext uri="{FF2B5EF4-FFF2-40B4-BE49-F238E27FC236}">
-                  <a16:creationId xmlns:a16="http://schemas.microsoft.com/office/drawing/2014/main" id="{0F5AC05B-D9A9-4C85-8044-36880573621C}"/>
-                </a:ext>
-              </a:extLst>
-            </p:cNvPr>
-            <p:cNvSpPr/>
-            <p:nvPr/>
-          </p:nvSpPr>
-          <p:spPr>
-            <a:xfrm>
-              <a:off x="2031492" y="4465320"/>
-              <a:ext cx="353568" cy="304800"/>
-            </a:xfrm>
-            <a:prstGeom prst="triangle">
-              <a:avLst/>
-            </a:prstGeom>
-            <a:solidFill>
-              <a:schemeClr val="bg1"/>
-            </a:solidFill>
-            <a:ln>
-              <a:solidFill>
-                <a:schemeClr val="tx1"/>
-              </a:solidFill>
-            </a:ln>
-          </p:spPr>
-          <p:style>
-            <a:lnRef idx="2">
-              <a:schemeClr val="accent1">
-                <a:shade val="50000"/>
-              </a:schemeClr>
-            </a:lnRef>
-            <a:fillRef idx="1">
-              <a:schemeClr val="accent1"/>
-            </a:fillRef>
-            <a:effectRef idx="0">
-              <a:schemeClr val="accent1"/>
-            </a:effectRef>
-            <a:fontRef idx="minor">
-              <a:schemeClr val="lt1"/>
-            </a:fontRef>
-          </p:style>
-          <p:txBody>
-            <a:bodyPr rtlCol="0" anchor="ctr"/>
-            <a:lstStyle/>
-            <a:p>
-              <a:pPr algn="ctr"/>
-              <a:endParaRPr lang="en-GB"/>
-            </a:p>
-          </p:txBody>
-        </p:sp>
-        <p:cxnSp>
-          <p:nvCxnSpPr>
-            <p:cNvPr id="17" name="Straight Connector 16">
-              <a:extLst>
-                <a:ext uri="{FF2B5EF4-FFF2-40B4-BE49-F238E27FC236}">
-                  <a16:creationId xmlns:a16="http://schemas.microsoft.com/office/drawing/2014/main" id="{57900A8A-271B-4E31-9DCE-8172E0D985DA}"/>
-                </a:ext>
-              </a:extLst>
-            </p:cNvPr>
-            <p:cNvCxnSpPr/>
-            <p:nvPr/>
-          </p:nvCxnSpPr>
-          <p:spPr>
-            <a:xfrm>
-              <a:off x="2031492" y="4465320"/>
-              <a:ext cx="353568" cy="0"/>
-            </a:xfrm>
-            <a:prstGeom prst="line">
-              <a:avLst/>
-            </a:prstGeom>
-            <a:ln w="19050">
-              <a:solidFill>
-                <a:schemeClr val="tx1"/>
-              </a:solidFill>
-            </a:ln>
-          </p:spPr>
-          <p:style>
-            <a:lnRef idx="1">
-              <a:schemeClr val="accent1"/>
-            </a:lnRef>
-            <a:fillRef idx="0">
-              <a:schemeClr val="accent1"/>
-            </a:fillRef>
-            <a:effectRef idx="0">
-              <a:schemeClr val="accent1"/>
-            </a:effectRef>
-            <a:fontRef idx="minor">
-              <a:schemeClr val="tx1"/>
-            </a:fontRef>
-          </p:style>
-        </p:cxnSp>
-      </p:grpSp>
+            <a:r>
+              <a:rPr lang="en-GB" dirty="0" smtClean="0"/>
+              <a:t>Buck</a:t>
+            </a:r>
+            <a:endParaRPr lang="en-GB" dirty="0"/>
+          </a:p>
+        </p:txBody>
+      </p:sp>
       <p:cxnSp>
         <p:nvCxnSpPr>
-          <p:cNvPr id="19" name="Straight Connector 18">
-            <a:extLst>
-              <a:ext uri="{FF2B5EF4-FFF2-40B4-BE49-F238E27FC236}">
-                <a16:creationId xmlns:a16="http://schemas.microsoft.com/office/drawing/2014/main" id="{5CEC469E-9174-4CC1-A363-D5498DE5663C}"/>
+          <p:cNvPr id="23" name="Straight Connector 18">
+            <a:extLst>
+              <a:ext uri="{FF2B5EF4-FFF2-40B4-BE49-F238E27FC236}">
+                <a16:creationId xmlns="" xmlns:a16="http://schemas.microsoft.com/office/drawing/2014/main" id="{1DEE2EFA-8D03-42C8-8206-343758AFD786}"/>
               </a:ext>
             </a:extLst>
           </p:cNvPr>
           <p:cNvCxnSpPr>
             <a:cxnSpLocks/>
-            <a:stCxn id="10" idx="3"/>
-            <a:endCxn id="6" idx="2"/>
+            <a:stCxn id="37" idx="3"/>
+            <a:endCxn id="8" idx="3"/>
           </p:cNvCxnSpPr>
           <p:nvPr/>
         </p:nvCxnSpPr>
         <p:spPr>
-          <a:xfrm rot="16200000" flipH="1">
-            <a:off x="618061" y="1931954"/>
-            <a:ext cx="577770" cy="902674"/>
-          </a:xfrm>
-          <a:prstGeom prst="bentConnector3">
-            <a:avLst>
-              <a:gd name="adj1" fmla="val 123080"/>
-            </a:avLst>
-          </a:prstGeom>
-          <a:ln w="25400">
-            <a:solidFill>
-              <a:schemeClr val="tx1"/>
-            </a:solidFill>
-          </a:ln>
-        </p:spPr>
-        <p:style>
-          <a:lnRef idx="1">
-            <a:schemeClr val="accent1"/>
-          </a:lnRef>
-          <a:fillRef idx="0">
-            <a:schemeClr val="accent1"/>
-          </a:fillRef>
-          <a:effectRef idx="0">
-            <a:schemeClr val="accent1"/>
-          </a:effectRef>
-          <a:fontRef idx="minor">
-            <a:schemeClr val="tx1"/>
-          </a:fontRef>
-        </p:style>
-      </p:cxnSp>
-      <p:cxnSp>
-        <p:nvCxnSpPr>
-          <p:cNvPr id="23" name="Straight Connector 18">
-            <a:extLst>
-              <a:ext uri="{FF2B5EF4-FFF2-40B4-BE49-F238E27FC236}">
-                <a16:creationId xmlns:a16="http://schemas.microsoft.com/office/drawing/2014/main" id="{1DEE2EFA-8D03-42C8-8206-343758AFD786}"/>
-              </a:ext>
-            </a:extLst>
-          </p:cNvPr>
-          <p:cNvCxnSpPr>
-            <a:cxnSpLocks/>
-            <a:endCxn id="8" idx="0"/>
-          </p:cNvCxnSpPr>
-          <p:nvPr/>
-        </p:nvCxnSpPr>
-        <p:spPr>
-          <a:xfrm>
-            <a:off x="3103262" y="1036190"/>
-            <a:ext cx="1" cy="393114"/>
+          <a:xfrm flipH="1">
+            <a:off x="1138687" y="1305224"/>
+            <a:ext cx="549133" cy="0"/>
           </a:xfrm>
           <a:prstGeom prst="straightConnector1">
             <a:avLst/>
@@ -3920,153 +3576,12 @@
           </a:fontRef>
         </p:style>
       </p:cxnSp>
-      <p:cxnSp>
-        <p:nvCxnSpPr>
-          <p:cNvPr id="24" name="Straight Connector 18">
-            <a:extLst>
-              <a:ext uri="{FF2B5EF4-FFF2-40B4-BE49-F238E27FC236}">
-                <a16:creationId xmlns:a16="http://schemas.microsoft.com/office/drawing/2014/main" id="{ABD12237-5BBE-493C-BE8E-30D12D7DA87D}"/>
-              </a:ext>
-            </a:extLst>
-          </p:cNvPr>
-          <p:cNvCxnSpPr>
-            <a:cxnSpLocks/>
-            <a:stCxn id="16" idx="0"/>
-            <a:endCxn id="8" idx="0"/>
-          </p:cNvCxnSpPr>
-          <p:nvPr/>
-        </p:nvCxnSpPr>
-        <p:spPr>
-          <a:xfrm rot="5400000" flipH="1" flipV="1">
-            <a:off x="2438694" y="1221383"/>
-            <a:ext cx="456647" cy="872491"/>
-          </a:xfrm>
-          <a:prstGeom prst="bentConnector3">
-            <a:avLst>
-              <a:gd name="adj1" fmla="val 150061"/>
-            </a:avLst>
-          </a:prstGeom>
-          <a:ln w="25400">
-            <a:solidFill>
-              <a:schemeClr val="tx1"/>
-            </a:solidFill>
-          </a:ln>
-        </p:spPr>
-        <p:style>
-          <a:lnRef idx="1">
-            <a:schemeClr val="accent1"/>
-          </a:lnRef>
-          <a:fillRef idx="0">
-            <a:schemeClr val="accent1"/>
-          </a:fillRef>
-          <a:effectRef idx="0">
-            <a:schemeClr val="accent1"/>
-          </a:effectRef>
-          <a:fontRef idx="minor">
-            <a:schemeClr val="tx1"/>
-          </a:fontRef>
-        </p:style>
-      </p:cxnSp>
-      <p:cxnSp>
-        <p:nvCxnSpPr>
-          <p:cNvPr id="25" name="Straight Connector 18">
-            <a:extLst>
-              <a:ext uri="{FF2B5EF4-FFF2-40B4-BE49-F238E27FC236}">
-                <a16:creationId xmlns:a16="http://schemas.microsoft.com/office/drawing/2014/main" id="{663F3391-7B58-43A0-AFC3-523F723824BC}"/>
-              </a:ext>
-            </a:extLst>
-          </p:cNvPr>
-          <p:cNvCxnSpPr>
-            <a:cxnSpLocks/>
-            <a:stCxn id="16" idx="3"/>
-            <a:endCxn id="8" idx="2"/>
-          </p:cNvCxnSpPr>
-          <p:nvPr/>
-        </p:nvCxnSpPr>
-        <p:spPr>
-          <a:xfrm rot="16200000" flipH="1">
-            <a:off x="2378132" y="1947045"/>
-            <a:ext cx="577770" cy="872491"/>
-          </a:xfrm>
-          <a:prstGeom prst="bentConnector3">
-            <a:avLst>
-              <a:gd name="adj1" fmla="val 125278"/>
-            </a:avLst>
-          </a:prstGeom>
-          <a:ln w="25400">
-            <a:solidFill>
-              <a:schemeClr val="tx1"/>
-            </a:solidFill>
-          </a:ln>
-        </p:spPr>
-        <p:style>
-          <a:lnRef idx="1">
-            <a:schemeClr val="accent1"/>
-          </a:lnRef>
-          <a:fillRef idx="0">
-            <a:schemeClr val="accent1"/>
-          </a:fillRef>
-          <a:effectRef idx="0">
-            <a:schemeClr val="accent1"/>
-          </a:effectRef>
-          <a:fontRef idx="minor">
-            <a:schemeClr val="tx1"/>
-          </a:fontRef>
-        </p:style>
-      </p:cxnSp>
-      <p:cxnSp>
-        <p:nvCxnSpPr>
-          <p:cNvPr id="26" name="Straight Connector 18">
-            <a:extLst>
-              <a:ext uri="{FF2B5EF4-FFF2-40B4-BE49-F238E27FC236}">
-                <a16:creationId xmlns:a16="http://schemas.microsoft.com/office/drawing/2014/main" id="{0A33C0DC-5828-46C2-AF63-0B332EDDCED9}"/>
-              </a:ext>
-            </a:extLst>
-          </p:cNvPr>
-          <p:cNvCxnSpPr>
-            <a:cxnSpLocks/>
-            <a:stCxn id="6" idx="0"/>
-            <a:endCxn id="10" idx="0"/>
-          </p:cNvCxnSpPr>
-          <p:nvPr/>
-        </p:nvCxnSpPr>
-        <p:spPr>
-          <a:xfrm rot="16200000" flipH="1" flipV="1">
-            <a:off x="678622" y="1206290"/>
-            <a:ext cx="456647" cy="902674"/>
-          </a:xfrm>
-          <a:prstGeom prst="bentConnector3">
-            <a:avLst>
-              <a:gd name="adj1" fmla="val -50061"/>
-            </a:avLst>
-          </a:prstGeom>
-          <a:ln w="25400">
-            <a:solidFill>
-              <a:schemeClr val="tx1"/>
-            </a:solidFill>
-          </a:ln>
-        </p:spPr>
-        <p:style>
-          <a:lnRef idx="1">
-            <a:schemeClr val="accent1"/>
-          </a:lnRef>
-          <a:fillRef idx="0">
-            <a:schemeClr val="accent1"/>
-          </a:fillRef>
-          <a:effectRef idx="0">
-            <a:schemeClr val="accent1"/>
-          </a:effectRef>
-          <a:fontRef idx="minor">
-            <a:schemeClr val="tx1"/>
-          </a:fontRef>
-        </p:style>
-      </p:cxnSp>
       <p:grpSp>
         <p:nvGrpSpPr>
-          <p:cNvPr id="33" name="Group 32">
-            <a:extLst>
-              <a:ext uri="{FF2B5EF4-FFF2-40B4-BE49-F238E27FC236}">
-                <a16:creationId xmlns:a16="http://schemas.microsoft.com/office/drawing/2014/main" id="{3FC3B183-B5E2-49DF-9A6F-5CD6D2CAD18E}"/>
+          <p:cNvPr id="36" name="Group 35">
+            <a:extLst>
+              <a:ext uri="{FF2B5EF4-FFF2-40B4-BE49-F238E27FC236}">
+                <a16:creationId xmlns="" xmlns:a16="http://schemas.microsoft.com/office/drawing/2014/main" id="{D173984A-F83D-4E82-B5D4-42CEDB5E49C2}"/>
               </a:ext>
             </a:extLst>
           </p:cNvPr>
@@ -4074,124 +3589,8 @@
           <p:nvPr/>
         </p:nvGrpSpPr>
         <p:grpSpPr>
-          <a:xfrm>
-            <a:off x="1237378" y="812097"/>
-            <a:ext cx="241808" cy="208455"/>
-            <a:chOff x="2031492" y="4465320"/>
-            <a:chExt cx="353568" cy="304800"/>
-          </a:xfrm>
-        </p:grpSpPr>
-        <p:sp>
-          <p:nvSpPr>
-            <p:cNvPr id="34" name="Isosceles Triangle 33">
-              <a:extLst>
-                <a:ext uri="{FF2B5EF4-FFF2-40B4-BE49-F238E27FC236}">
-                  <a16:creationId xmlns:a16="http://schemas.microsoft.com/office/drawing/2014/main" id="{C1EE998D-F29C-46E8-81C1-C75D2F0565CF}"/>
-                </a:ext>
-              </a:extLst>
-            </p:cNvPr>
-            <p:cNvSpPr/>
-            <p:nvPr/>
-          </p:nvSpPr>
-          <p:spPr>
-            <a:xfrm>
-              <a:off x="2031492" y="4465320"/>
-              <a:ext cx="353568" cy="304800"/>
-            </a:xfrm>
-            <a:prstGeom prst="triangle">
-              <a:avLst/>
-            </a:prstGeom>
-            <a:solidFill>
-              <a:schemeClr val="bg1"/>
-            </a:solidFill>
-            <a:ln>
-              <a:solidFill>
-                <a:schemeClr val="tx1"/>
-              </a:solidFill>
-            </a:ln>
-          </p:spPr>
-          <p:style>
-            <a:lnRef idx="2">
-              <a:schemeClr val="accent1">
-                <a:shade val="50000"/>
-              </a:schemeClr>
-            </a:lnRef>
-            <a:fillRef idx="1">
-              <a:schemeClr val="accent1"/>
-            </a:fillRef>
-            <a:effectRef idx="0">
-              <a:schemeClr val="accent1"/>
-            </a:effectRef>
-            <a:fontRef idx="minor">
-              <a:schemeClr val="lt1"/>
-            </a:fontRef>
-          </p:style>
-          <p:txBody>
-            <a:bodyPr rtlCol="0" anchor="ctr"/>
-            <a:lstStyle/>
-            <a:p>
-              <a:pPr algn="ctr"/>
-              <a:endParaRPr lang="en-GB"/>
-            </a:p>
-          </p:txBody>
-        </p:sp>
-        <p:cxnSp>
-          <p:nvCxnSpPr>
-            <p:cNvPr id="35" name="Straight Connector 34">
-              <a:extLst>
-                <a:ext uri="{FF2B5EF4-FFF2-40B4-BE49-F238E27FC236}">
-                  <a16:creationId xmlns:a16="http://schemas.microsoft.com/office/drawing/2014/main" id="{7407ED39-11C8-4EFF-906C-2E1718D44963}"/>
-                </a:ext>
-              </a:extLst>
-            </p:cNvPr>
-            <p:cNvCxnSpPr/>
-            <p:nvPr/>
-          </p:nvCxnSpPr>
-          <p:spPr>
-            <a:xfrm>
-              <a:off x="2031492" y="4465320"/>
-              <a:ext cx="353568" cy="0"/>
-            </a:xfrm>
-            <a:prstGeom prst="line">
-              <a:avLst/>
-            </a:prstGeom>
-            <a:ln w="19050">
-              <a:solidFill>
-                <a:schemeClr val="tx1"/>
-              </a:solidFill>
-            </a:ln>
-          </p:spPr>
-          <p:style>
-            <a:lnRef idx="1">
-              <a:schemeClr val="accent1"/>
-            </a:lnRef>
-            <a:fillRef idx="0">
-              <a:schemeClr val="accent1"/>
-            </a:fillRef>
-            <a:effectRef idx="0">
-              <a:schemeClr val="accent1"/>
-            </a:effectRef>
-            <a:fontRef idx="minor">
-              <a:schemeClr val="tx1"/>
-            </a:fontRef>
-          </p:style>
-        </p:cxnSp>
-      </p:grpSp>
-      <p:grpSp>
-        <p:nvGrpSpPr>
-          <p:cNvPr id="36" name="Group 35">
-            <a:extLst>
-              <a:ext uri="{FF2B5EF4-FFF2-40B4-BE49-F238E27FC236}">
-                <a16:creationId xmlns:a16="http://schemas.microsoft.com/office/drawing/2014/main" id="{D173984A-F83D-4E82-B5D4-42CEDB5E49C2}"/>
-              </a:ext>
-            </a:extLst>
-          </p:cNvPr>
-          <p:cNvGrpSpPr/>
-          <p:nvPr/>
-        </p:nvGrpSpPr>
-        <p:grpSpPr>
-          <a:xfrm>
-            <a:off x="2982358" y="812097"/>
+          <a:xfrm rot="5400000">
+            <a:off x="1671143" y="1200996"/>
             <a:ext cx="241808" cy="208455"/>
             <a:chOff x="2031492" y="4465320"/>
             <a:chExt cx="353568" cy="304800"/>
@@ -4202,7 +3601,7 @@
             <p:cNvPr id="37" name="Isosceles Triangle 36">
               <a:extLst>
                 <a:ext uri="{FF2B5EF4-FFF2-40B4-BE49-F238E27FC236}">
-                  <a16:creationId xmlns:a16="http://schemas.microsoft.com/office/drawing/2014/main" id="{7D597B8C-E7CD-4467-829E-2220F963E18C}"/>
+                  <a16:creationId xmlns="" xmlns:a16="http://schemas.microsoft.com/office/drawing/2014/main" id="{7D597B8C-E7CD-4467-829E-2220F963E18C}"/>
                 </a:ext>
               </a:extLst>
             </p:cNvPr>
@@ -4256,7 +3655,7 @@
             <p:cNvPr id="38" name="Straight Connector 37">
               <a:extLst>
                 <a:ext uri="{FF2B5EF4-FFF2-40B4-BE49-F238E27FC236}">
-                  <a16:creationId xmlns:a16="http://schemas.microsoft.com/office/drawing/2014/main" id="{EF502C49-91B2-4ADB-855C-AF42D8EA8618}"/>
+                  <a16:creationId xmlns="" xmlns:a16="http://schemas.microsoft.com/office/drawing/2014/main" id="{EF502C49-91B2-4ADB-855C-AF42D8EA8618}"/>
                 </a:ext>
               </a:extLst>
             </p:cNvPr>
@@ -4293,25 +3692,383 @@
           </p:style>
         </p:cxnSp>
       </p:grpSp>
+      <p:sp>
+        <p:nvSpPr>
+          <p:cNvPr id="31" name="Rectangle 7">
+            <a:extLst>
+              <a:ext uri="{FF2B5EF4-FFF2-40B4-BE49-F238E27FC236}">
+                <a16:creationId xmlns="" xmlns:a16="http://schemas.microsoft.com/office/drawing/2014/main" id="{A538DD01-2636-4589-96E2-29858AFC475E}"/>
+              </a:ext>
+            </a:extLst>
+          </p:cNvPr>
+          <p:cNvSpPr/>
+          <p:nvPr/>
+        </p:nvSpPr>
+        <p:spPr>
+          <a:xfrm>
+            <a:off x="2524755" y="875575"/>
+            <a:ext cx="818379" cy="859297"/>
+          </a:xfrm>
+          <a:prstGeom prst="rect">
+            <a:avLst/>
+          </a:prstGeom>
+          <a:solidFill>
+            <a:schemeClr val="accent1">
+              <a:lumMod val="40000"/>
+              <a:lumOff val="60000"/>
+            </a:schemeClr>
+          </a:solidFill>
+        </p:spPr>
+        <p:style>
+          <a:lnRef idx="2">
+            <a:schemeClr val="accent1">
+              <a:shade val="50000"/>
+            </a:schemeClr>
+          </a:lnRef>
+          <a:fillRef idx="1">
+            <a:schemeClr val="accent1"/>
+          </a:fillRef>
+          <a:effectRef idx="0">
+            <a:schemeClr val="accent1"/>
+          </a:effectRef>
+          <a:fontRef idx="minor">
+            <a:schemeClr val="lt1"/>
+          </a:fontRef>
+        </p:style>
+        <p:txBody>
+          <a:bodyPr rtlCol="0" anchor="ctr"/>
+          <a:lstStyle/>
+          <a:p>
+            <a:pPr algn="ctr"/>
+            <a:r>
+              <a:rPr lang="de-DE" sz="1200" dirty="0" smtClean="0">
+                <a:solidFill>
+                  <a:schemeClr val="tx1"/>
+                </a:solidFill>
+              </a:rPr>
+              <a:t>Buck</a:t>
+            </a:r>
+          </a:p>
+          <a:p>
+            <a:pPr algn="ctr"/>
+            <a:endParaRPr lang="en-GB" sz="1200" dirty="0">
+              <a:solidFill>
+                <a:schemeClr val="tx1"/>
+              </a:solidFill>
+            </a:endParaRPr>
+          </a:p>
+        </p:txBody>
+      </p:sp>
       <p:cxnSp>
         <p:nvCxnSpPr>
-          <p:cNvPr id="39" name="Straight Connector 18">
-            <a:extLst>
-              <a:ext uri="{FF2B5EF4-FFF2-40B4-BE49-F238E27FC236}">
-                <a16:creationId xmlns:a16="http://schemas.microsoft.com/office/drawing/2014/main" id="{E19EA2E6-0A5E-44EC-A09E-DDFAE928BAF1}"/>
+          <p:cNvPr id="32" name="Straight Connector 18">
+            <a:extLst>
+              <a:ext uri="{FF2B5EF4-FFF2-40B4-BE49-F238E27FC236}">
+                <a16:creationId xmlns="" xmlns:a16="http://schemas.microsoft.com/office/drawing/2014/main" id="{1DEE2EFA-8D03-42C8-8206-343758AFD786}"/>
               </a:ext>
             </a:extLst>
           </p:cNvPr>
           <p:cNvCxnSpPr>
             <a:cxnSpLocks/>
-            <a:endCxn id="6" idx="0"/>
+            <a:stCxn id="31" idx="1"/>
+            <a:endCxn id="37" idx="0"/>
+          </p:cNvCxnSpPr>
+          <p:nvPr/>
+        </p:nvCxnSpPr>
+        <p:spPr>
+          <a:xfrm flipH="1">
+            <a:off x="1896275" y="1305224"/>
+            <a:ext cx="628480" cy="0"/>
+          </a:xfrm>
+          <a:prstGeom prst="straightConnector1">
+            <a:avLst/>
+          </a:prstGeom>
+          <a:ln w="25400">
+            <a:solidFill>
+              <a:schemeClr val="tx1"/>
+            </a:solidFill>
+          </a:ln>
+        </p:spPr>
+        <p:style>
+          <a:lnRef idx="1">
+            <a:schemeClr val="accent1"/>
+          </a:lnRef>
+          <a:fillRef idx="0">
+            <a:schemeClr val="accent1"/>
+          </a:fillRef>
+          <a:effectRef idx="0">
+            <a:schemeClr val="accent1"/>
+          </a:effectRef>
+          <a:fontRef idx="minor">
+            <a:schemeClr val="tx1"/>
+          </a:fontRef>
+        </p:style>
+      </p:cxnSp>
+      <p:sp>
+        <p:nvSpPr>
+          <p:cNvPr id="40" name="Rectangle 7">
+            <a:extLst>
+              <a:ext uri="{FF2B5EF4-FFF2-40B4-BE49-F238E27FC236}">
+                <a16:creationId xmlns="" xmlns:a16="http://schemas.microsoft.com/office/drawing/2014/main" id="{A538DD01-2636-4589-96E2-29858AFC475E}"/>
+              </a:ext>
+            </a:extLst>
+          </p:cNvPr>
+          <p:cNvSpPr/>
+          <p:nvPr/>
+        </p:nvSpPr>
+        <p:spPr>
+          <a:xfrm>
+            <a:off x="2524755" y="2574256"/>
+            <a:ext cx="818379" cy="859297"/>
+          </a:xfrm>
+          <a:prstGeom prst="rect">
+            <a:avLst/>
+          </a:prstGeom>
+          <a:solidFill>
+            <a:schemeClr val="accent1">
+              <a:lumMod val="40000"/>
+              <a:lumOff val="60000"/>
+            </a:schemeClr>
+          </a:solidFill>
+        </p:spPr>
+        <p:style>
+          <a:lnRef idx="2">
+            <a:schemeClr val="accent1">
+              <a:shade val="50000"/>
+            </a:schemeClr>
+          </a:lnRef>
+          <a:fillRef idx="1">
+            <a:schemeClr val="accent1"/>
+          </a:fillRef>
+          <a:effectRef idx="0">
+            <a:schemeClr val="accent1"/>
+          </a:effectRef>
+          <a:fontRef idx="minor">
+            <a:schemeClr val="lt1"/>
+          </a:fontRef>
+        </p:style>
+        <p:txBody>
+          <a:bodyPr rtlCol="0" anchor="ctr"/>
+          <a:lstStyle/>
+          <a:p>
+            <a:pPr algn="ctr"/>
+            <a:r>
+              <a:rPr lang="de-DE" sz="1200" dirty="0" smtClean="0">
+                <a:solidFill>
+                  <a:schemeClr val="tx1"/>
+                </a:solidFill>
+              </a:rPr>
+              <a:t>Bat. </a:t>
+            </a:r>
+            <a:r>
+              <a:rPr lang="de-DE" sz="1200" dirty="0" err="1" smtClean="0">
+                <a:solidFill>
+                  <a:schemeClr val="tx1"/>
+                </a:solidFill>
+              </a:rPr>
+              <a:t>Ch</a:t>
+            </a:r>
+            <a:endParaRPr lang="en-GB" sz="1200" dirty="0">
+              <a:solidFill>
+                <a:schemeClr val="tx1"/>
+              </a:solidFill>
+            </a:endParaRPr>
+          </a:p>
+        </p:txBody>
+      </p:sp>
+      <p:cxnSp>
+        <p:nvCxnSpPr>
+          <p:cNvPr id="41" name="Straight Connector 18">
+            <a:extLst>
+              <a:ext uri="{FF2B5EF4-FFF2-40B4-BE49-F238E27FC236}">
+                <a16:creationId xmlns="" xmlns:a16="http://schemas.microsoft.com/office/drawing/2014/main" id="{1DEE2EFA-8D03-42C8-8206-343758AFD786}"/>
+              </a:ext>
+            </a:extLst>
+          </p:cNvPr>
+          <p:cNvCxnSpPr>
+            <a:cxnSpLocks/>
+            <a:stCxn id="40" idx="0"/>
+            <a:endCxn id="31" idx="2"/>
+          </p:cNvCxnSpPr>
+          <p:nvPr/>
+        </p:nvCxnSpPr>
+        <p:spPr>
+          <a:xfrm flipV="1">
+            <a:off x="2933945" y="1734872"/>
+            <a:ext cx="0" cy="839384"/>
+          </a:xfrm>
+          <a:prstGeom prst="straightConnector1">
+            <a:avLst/>
+          </a:prstGeom>
+          <a:ln w="25400">
+            <a:solidFill>
+              <a:schemeClr val="tx1"/>
+            </a:solidFill>
+          </a:ln>
+        </p:spPr>
+        <p:style>
+          <a:lnRef idx="1">
+            <a:schemeClr val="accent1"/>
+          </a:lnRef>
+          <a:fillRef idx="0">
+            <a:schemeClr val="accent1"/>
+          </a:fillRef>
+          <a:effectRef idx="0">
+            <a:schemeClr val="accent1"/>
+          </a:effectRef>
+          <a:fontRef idx="minor">
+            <a:schemeClr val="tx1"/>
+          </a:fontRef>
+        </p:style>
+      </p:cxnSp>
+      <p:sp>
+        <p:nvSpPr>
+          <p:cNvPr id="42" name="Rectangle 7">
+            <a:extLst>
+              <a:ext uri="{FF2B5EF4-FFF2-40B4-BE49-F238E27FC236}">
+                <a16:creationId xmlns="" xmlns:a16="http://schemas.microsoft.com/office/drawing/2014/main" id="{A538DD01-2636-4589-96E2-29858AFC475E}"/>
+              </a:ext>
+            </a:extLst>
+          </p:cNvPr>
+          <p:cNvSpPr/>
+          <p:nvPr/>
+        </p:nvSpPr>
+        <p:spPr>
+          <a:xfrm>
+            <a:off x="4044990" y="2574256"/>
+            <a:ext cx="818379" cy="859297"/>
+          </a:xfrm>
+          <a:prstGeom prst="rect">
+            <a:avLst/>
+          </a:prstGeom>
+          <a:solidFill>
+            <a:schemeClr val="accent1">
+              <a:lumMod val="40000"/>
+              <a:lumOff val="60000"/>
+            </a:schemeClr>
+          </a:solidFill>
+        </p:spPr>
+        <p:style>
+          <a:lnRef idx="2">
+            <a:schemeClr val="accent1">
+              <a:shade val="50000"/>
+            </a:schemeClr>
+          </a:lnRef>
+          <a:fillRef idx="1">
+            <a:schemeClr val="accent1"/>
+          </a:fillRef>
+          <a:effectRef idx="0">
+            <a:schemeClr val="accent1"/>
+          </a:effectRef>
+          <a:fontRef idx="minor">
+            <a:schemeClr val="lt1"/>
+          </a:fontRef>
+        </p:style>
+        <p:txBody>
+          <a:bodyPr rtlCol="0" anchor="ctr"/>
+          <a:lstStyle/>
+          <a:p>
+            <a:pPr algn="ctr"/>
+            <a:r>
+              <a:rPr lang="de-DE" sz="1200" dirty="0" err="1" smtClean="0">
+                <a:solidFill>
+                  <a:schemeClr val="tx1"/>
+                </a:solidFill>
+              </a:rPr>
+              <a:t>Battery</a:t>
+            </a:r>
+            <a:endParaRPr lang="en-GB" sz="1200" dirty="0">
+              <a:solidFill>
+                <a:schemeClr val="tx1"/>
+              </a:solidFill>
+            </a:endParaRPr>
+          </a:p>
+        </p:txBody>
+      </p:sp>
+      <p:sp>
+        <p:nvSpPr>
+          <p:cNvPr id="15" name="Rectangle 7">
+            <a:extLst>
+              <a:ext uri="{FF2B5EF4-FFF2-40B4-BE49-F238E27FC236}">
+                <a16:creationId xmlns="" xmlns:a16="http://schemas.microsoft.com/office/drawing/2014/main" id="{A538DD01-2636-4589-96E2-29858AFC475E}"/>
+              </a:ext>
+            </a:extLst>
+          </p:cNvPr>
+          <p:cNvSpPr/>
+          <p:nvPr/>
+        </p:nvSpPr>
+        <p:spPr>
+          <a:xfrm>
+            <a:off x="5603314" y="2574256"/>
+            <a:ext cx="818379" cy="859297"/>
+          </a:xfrm>
+          <a:prstGeom prst="rect">
+            <a:avLst/>
+          </a:prstGeom>
+          <a:solidFill>
+            <a:schemeClr val="accent1">
+              <a:lumMod val="40000"/>
+              <a:lumOff val="60000"/>
+            </a:schemeClr>
+          </a:solidFill>
+        </p:spPr>
+        <p:style>
+          <a:lnRef idx="2">
+            <a:schemeClr val="accent1">
+              <a:shade val="50000"/>
+            </a:schemeClr>
+          </a:lnRef>
+          <a:fillRef idx="1">
+            <a:schemeClr val="accent1"/>
+          </a:fillRef>
+          <a:effectRef idx="0">
+            <a:schemeClr val="accent1"/>
+          </a:effectRef>
+          <a:fontRef idx="minor">
+            <a:schemeClr val="lt1"/>
+          </a:fontRef>
+        </p:style>
+        <p:txBody>
+          <a:bodyPr rtlCol="0" anchor="ctr"/>
+          <a:lstStyle/>
+          <a:p>
+            <a:pPr algn="ctr"/>
+            <a:r>
+              <a:rPr lang="de-DE" sz="1200" dirty="0" err="1" smtClean="0">
+                <a:solidFill>
+                  <a:schemeClr val="tx1"/>
+                </a:solidFill>
+              </a:rPr>
+              <a:t>Boost</a:t>
+            </a:r>
+            <a:endParaRPr lang="en-GB" sz="1200" dirty="0">
+              <a:solidFill>
+                <a:schemeClr val="tx1"/>
+              </a:solidFill>
+            </a:endParaRPr>
+          </a:p>
+        </p:txBody>
+      </p:sp>
+      <p:cxnSp>
+        <p:nvCxnSpPr>
+          <p:cNvPr id="16" name="Straight Connector 18">
+            <a:extLst>
+              <a:ext uri="{FF2B5EF4-FFF2-40B4-BE49-F238E27FC236}">
+                <a16:creationId xmlns="" xmlns:a16="http://schemas.microsoft.com/office/drawing/2014/main" id="{1DEE2EFA-8D03-42C8-8206-343758AFD786}"/>
+              </a:ext>
+            </a:extLst>
+          </p:cNvPr>
+          <p:cNvCxnSpPr>
+            <a:cxnSpLocks/>
+            <a:stCxn id="40" idx="3"/>
+            <a:endCxn id="42" idx="1"/>
           </p:cNvCxnSpPr>
           <p:nvPr/>
         </p:nvCxnSpPr>
         <p:spPr>
           <a:xfrm>
-            <a:off x="1355379" y="1036191"/>
-            <a:ext cx="2904" cy="393113"/>
+            <a:off x="3343134" y="3003905"/>
+            <a:ext cx="701856" cy="0"/>
           </a:xfrm>
           <a:prstGeom prst="straightConnector1">
             <a:avLst/>
@@ -4339,29 +4096,27 @@
       </p:cxnSp>
       <p:cxnSp>
         <p:nvCxnSpPr>
-          <p:cNvPr id="44" name="Straight Connector 18">
-            <a:extLst>
-              <a:ext uri="{FF2B5EF4-FFF2-40B4-BE49-F238E27FC236}">
-                <a16:creationId xmlns:a16="http://schemas.microsoft.com/office/drawing/2014/main" id="{F2935AB3-37EF-4EEB-ACCF-6753CEC083F0}"/>
+          <p:cNvPr id="19" name="Straight Connector 18">
+            <a:extLst>
+              <a:ext uri="{FF2B5EF4-FFF2-40B4-BE49-F238E27FC236}">
+                <a16:creationId xmlns="" xmlns:a16="http://schemas.microsoft.com/office/drawing/2014/main" id="{1DEE2EFA-8D03-42C8-8206-343758AFD786}"/>
               </a:ext>
             </a:extLst>
           </p:cNvPr>
           <p:cNvCxnSpPr>
             <a:cxnSpLocks/>
-            <a:stCxn id="34" idx="0"/>
-            <a:endCxn id="37" idx="0"/>
+            <a:stCxn id="42" idx="3"/>
+            <a:endCxn id="15" idx="1"/>
           </p:cNvCxnSpPr>
           <p:nvPr/>
         </p:nvCxnSpPr>
         <p:spPr>
-          <a:xfrm rot="5400000" flipH="1" flipV="1">
-            <a:off x="2230772" y="-60393"/>
-            <a:ext cx="12700" cy="1744980"/>
+          <a:xfrm>
+            <a:off x="4863369" y="3003905"/>
+            <a:ext cx="739945" cy="0"/>
           </a:xfrm>
-          <a:prstGeom prst="bentConnector3">
-            <a:avLst>
-              <a:gd name="adj1" fmla="val 1800000"/>
-            </a:avLst>
+          <a:prstGeom prst="straightConnector1">
+            <a:avLst/>
           </a:prstGeom>
           <a:ln w="25400">
             <a:solidFill>
@@ -4419,7 +4174,7 @@
           <p:cNvPr id="3" name="Content Placeholder 2">
             <a:extLst>
               <a:ext uri="{FF2B5EF4-FFF2-40B4-BE49-F238E27FC236}">
-                <a16:creationId xmlns:a16="http://schemas.microsoft.com/office/drawing/2014/main" id="{95539A32-1FF5-447C-8426-8A5584EB1B7D}"/>
+                <a16:creationId xmlns="" xmlns:a16="http://schemas.microsoft.com/office/drawing/2014/main" id="{95539A32-1FF5-447C-8426-8A5584EB1B7D}"/>
               </a:ext>
             </a:extLst>
           </p:cNvPr>

</xml_diff>